<commit_message>
More Loops lecture update
</commit_message>
<xml_diff>
--- a/slides/On-Campus/07_02_MoreLoops.pptx
+++ b/slides/On-Campus/07_02_MoreLoops.pptx
@@ -149,1088 +149,57 @@
 <pc:chgInfo xmlns:a="http://schemas.openxmlformats.org/drawingml/2006/main" xmlns:r="http://schemas.openxmlformats.org/officeDocument/2006/relationships" xmlns:ac="http://schemas.microsoft.com/office/drawing/2013/main/command" xmlns:pc="http://schemas.microsoft.com/office/powerpoint/2013/main/command">
   <pc:docChgLst>
     <pc:chgData name="Marcia Moraes" userId="c9c67e8a-58e2-4733-9a1c-5d44fec4775b" providerId="ADAL" clId="{C1C84319-6A3A-4D52-931F-09658F5FD03D}"/>
-    <pc:docChg chg="undo custSel modSld modMainMaster">
-      <pc:chgData name="Marcia Moraes" userId="c9c67e8a-58e2-4733-9a1c-5d44fec4775b" providerId="ADAL" clId="{C1C84319-6A3A-4D52-931F-09658F5FD03D}" dt="2023-02-28T16:57:08.231" v="117" actId="5793"/>
+  </pc:docChgLst>
+  <pc:docChgLst>
+    <pc:chgData name="Marcia Moraes" userId="c9c67e8a-58e2-4733-9a1c-5d44fec4775b" providerId="ADAL" clId="{F56CB85A-9889-4B47-B6A3-D21A0BED632A}"/>
+    <pc:docChg chg="custSel modSld">
+      <pc:chgData name="Marcia Moraes" userId="c9c67e8a-58e2-4733-9a1c-5d44fec4775b" providerId="ADAL" clId="{F56CB85A-9889-4B47-B6A3-D21A0BED632A}" dt="2023-09-14T15:31:33.834" v="173" actId="14100"/>
       <pc:docMkLst>
         <pc:docMk/>
       </pc:docMkLst>
-      <pc:sldChg chg="delSp">
-        <pc:chgData name="Marcia Moraes" userId="c9c67e8a-58e2-4733-9a1c-5d44fec4775b" providerId="ADAL" clId="{C1C84319-6A3A-4D52-931F-09658F5FD03D}" dt="2023-02-28T16:56:25.400" v="67" actId="478"/>
-        <pc:sldMkLst>
-          <pc:docMk/>
-          <pc:sldMk cId="926474781" sldId="266"/>
-        </pc:sldMkLst>
-        <pc:spChg chg="del">
-          <ac:chgData name="Marcia Moraes" userId="c9c67e8a-58e2-4733-9a1c-5d44fec4775b" providerId="ADAL" clId="{C1C84319-6A3A-4D52-931F-09658F5FD03D}" dt="2023-02-28T16:56:25.400" v="67" actId="478"/>
-          <ac:spMkLst>
-            <pc:docMk/>
-            <pc:sldMk cId="926474781" sldId="266"/>
-            <ac:spMk id="6" creationId="{32A3B87A-BBC0-704B-AC99-3984206450D5}"/>
-          </ac:spMkLst>
-        </pc:spChg>
-      </pc:sldChg>
-      <pc:sldChg chg="modSp">
-        <pc:chgData name="Marcia Moraes" userId="c9c67e8a-58e2-4733-9a1c-5d44fec4775b" providerId="ADAL" clId="{C1C84319-6A3A-4D52-931F-09658F5FD03D}" dt="2023-02-28T16:57:08.231" v="117" actId="5793"/>
+      <pc:sldChg chg="addSp modSp">
+        <pc:chgData name="Marcia Moraes" userId="c9c67e8a-58e2-4733-9a1c-5d44fec4775b" providerId="ADAL" clId="{F56CB85A-9889-4B47-B6A3-D21A0BED632A}" dt="2023-09-14T15:31:33.834" v="173" actId="14100"/>
         <pc:sldMkLst>
           <pc:docMk/>
           <pc:sldMk cId="2571368551" sldId="267"/>
         </pc:sldMkLst>
         <pc:spChg chg="mod">
-          <ac:chgData name="Marcia Moraes" userId="c9c67e8a-58e2-4733-9a1c-5d44fec4775b" providerId="ADAL" clId="{C1C84319-6A3A-4D52-931F-09658F5FD03D}" dt="2023-02-28T16:57:08.231" v="117" actId="5793"/>
+          <ac:chgData name="Marcia Moraes" userId="c9c67e8a-58e2-4733-9a1c-5d44fec4775b" providerId="ADAL" clId="{F56CB85A-9889-4B47-B6A3-D21A0BED632A}" dt="2023-09-14T15:30:07.435" v="0" actId="1076"/>
+          <ac:spMkLst>
+            <pc:docMk/>
+            <pc:sldMk cId="2571368551" sldId="267"/>
+            <ac:spMk id="6" creationId="{A2494937-C0C7-4ABC-A6FF-48F67C26DCCE}"/>
+          </ac:spMkLst>
+        </pc:spChg>
+        <pc:spChg chg="add mod">
+          <ac:chgData name="Marcia Moraes" userId="c9c67e8a-58e2-4733-9a1c-5d44fec4775b" providerId="ADAL" clId="{F56CB85A-9889-4B47-B6A3-D21A0BED632A}" dt="2023-09-14T15:31:28.185" v="172" actId="1076"/>
+          <ac:spMkLst>
+            <pc:docMk/>
+            <pc:sldMk cId="2571368551" sldId="267"/>
+            <ac:spMk id="8" creationId="{419DC34A-9F78-44AD-852D-CFFD0B137F12}"/>
+          </ac:spMkLst>
+        </pc:spChg>
+        <pc:spChg chg="mod">
+          <ac:chgData name="Marcia Moraes" userId="c9c67e8a-58e2-4733-9a1c-5d44fec4775b" providerId="ADAL" clId="{F56CB85A-9889-4B47-B6A3-D21A0BED632A}" dt="2023-09-14T15:31:33.834" v="173" actId="14100"/>
           <ac:spMkLst>
             <pc:docMk/>
             <pc:sldMk cId="2571368551" sldId="267"/>
             <ac:spMk id="11" creationId="{BDA0DBC1-29A7-4498-B9AA-9B174D0FEC3E}"/>
           </ac:spMkLst>
         </pc:spChg>
+        <pc:graphicFrameChg chg="add mod">
+          <ac:chgData name="Marcia Moraes" userId="c9c67e8a-58e2-4733-9a1c-5d44fec4775b" providerId="ADAL" clId="{F56CB85A-9889-4B47-B6A3-D21A0BED632A}" dt="2023-09-14T15:31:28.185" v="172" actId="1076"/>
+          <ac:graphicFrameMkLst>
+            <pc:docMk/>
+            <pc:sldMk cId="2571368551" sldId="267"/>
+            <ac:graphicFrameMk id="7" creationId="{DBD9EAF6-034F-4596-8BB2-87D6191C9F87}"/>
+          </ac:graphicFrameMkLst>
+        </pc:graphicFrameChg>
       </pc:sldChg>
-      <pc:sldMasterChg chg="modSldLayout">
-        <pc:chgData name="Marcia Moraes" userId="c9c67e8a-58e2-4733-9a1c-5d44fec4775b" providerId="ADAL" clId="{C1C84319-6A3A-4D52-931F-09658F5FD03D}" dt="2023-02-28T16:55:59.945" v="66" actId="20577"/>
-        <pc:sldMasterMkLst>
-          <pc:docMk/>
-          <pc:sldMasterMk cId="3965733437" sldId="2147483648"/>
-        </pc:sldMasterMkLst>
-        <pc:sldLayoutChg chg="modSp">
-          <pc:chgData name="Marcia Moraes" userId="c9c67e8a-58e2-4733-9a1c-5d44fec4775b" providerId="ADAL" clId="{C1C84319-6A3A-4D52-931F-09658F5FD03D}" dt="2023-02-28T16:55:59.945" v="66" actId="20577"/>
-          <pc:sldLayoutMkLst>
-            <pc:docMk/>
-            <pc:sldMasterMk cId="3965733437" sldId="2147483648"/>
-            <pc:sldLayoutMk cId="0" sldId="2147483689"/>
-          </pc:sldLayoutMkLst>
-          <pc:spChg chg="mod">
-            <ac:chgData name="Marcia Moraes" userId="c9c67e8a-58e2-4733-9a1c-5d44fec4775b" providerId="ADAL" clId="{C1C84319-6A3A-4D52-931F-09658F5FD03D}" dt="2023-02-28T16:55:41.711" v="1" actId="1076"/>
-            <ac:spMkLst>
-              <pc:docMk/>
-              <pc:sldMasterMk cId="3965733437" sldId="2147483648"/>
-              <pc:sldLayoutMk cId="0" sldId="2147483689"/>
-              <ac:spMk id="9" creationId="{518974DB-51D0-2C49-9088-48CE2D84AB1C}"/>
-            </ac:spMkLst>
-          </pc:spChg>
-          <pc:spChg chg="mod">
-            <ac:chgData name="Marcia Moraes" userId="c9c67e8a-58e2-4733-9a1c-5d44fec4775b" providerId="ADAL" clId="{C1C84319-6A3A-4D52-931F-09658F5FD03D}" dt="2023-02-28T16:55:59.945" v="66" actId="20577"/>
-            <ac:spMkLst>
-              <pc:docMk/>
-              <pc:sldMasterMk cId="3965733437" sldId="2147483648"/>
-              <pc:sldLayoutMk cId="0" sldId="2147483689"/>
-              <ac:spMk id="11" creationId="{F621E987-BD36-AF48-B11C-CC4BAD65092F}"/>
-            </ac:spMkLst>
-          </pc:spChg>
-          <pc:picChg chg="mod">
-            <ac:chgData name="Marcia Moraes" userId="c9c67e8a-58e2-4733-9a1c-5d44fec4775b" providerId="ADAL" clId="{C1C84319-6A3A-4D52-931F-09658F5FD03D}" dt="2023-02-28T16:55:39.034" v="0" actId="1076"/>
-            <ac:picMkLst>
-              <pc:docMk/>
-              <pc:sldMasterMk cId="3965733437" sldId="2147483648"/>
-              <pc:sldLayoutMk cId="0" sldId="2147483689"/>
-              <ac:picMk id="7" creationId="{00000000-0000-0000-0000-000000000000}"/>
-            </ac:picMkLst>
-          </pc:picChg>
-        </pc:sldLayoutChg>
-      </pc:sldMasterChg>
     </pc:docChg>
   </pc:docChgLst>
   <pc:docChgLst>
     <pc:chgData name="Marcia Moraes" userId="c9c67e8a-58e2-4733-9a1c-5d44fec4775b" providerId="ADAL" clId="{CF9B6DE9-563F-497F-8B3B-C591D75A312C}"/>
-    <pc:docChg chg="custSel addSld delSld modSld sldOrd">
-      <pc:chgData name="Marcia Moraes" userId="c9c67e8a-58e2-4733-9a1c-5d44fec4775b" providerId="ADAL" clId="{CF9B6DE9-563F-497F-8B3B-C591D75A312C}" dt="2023-03-01T04:01:33.695" v="1288" actId="1076"/>
-      <pc:docMkLst>
-        <pc:docMk/>
-      </pc:docMkLst>
-      <pc:sldChg chg="del">
-        <pc:chgData name="Marcia Moraes" userId="c9c67e8a-58e2-4733-9a1c-5d44fec4775b" providerId="ADAL" clId="{CF9B6DE9-563F-497F-8B3B-C591D75A312C}" dt="2023-03-01T01:15:15.233" v="23" actId="2696"/>
-        <pc:sldMkLst>
-          <pc:docMk/>
-          <pc:sldMk cId="2656504816" sldId="257"/>
-        </pc:sldMkLst>
-      </pc:sldChg>
-      <pc:sldChg chg="delSp del modAnim">
-        <pc:chgData name="Marcia Moraes" userId="c9c67e8a-58e2-4733-9a1c-5d44fec4775b" providerId="ADAL" clId="{CF9B6DE9-563F-497F-8B3B-C591D75A312C}" dt="2023-03-01T01:26:56.100" v="265" actId="2696"/>
-        <pc:sldMkLst>
-          <pc:docMk/>
-          <pc:sldMk cId="4259123250" sldId="258"/>
-        </pc:sldMkLst>
-        <pc:spChg chg="del">
-          <ac:chgData name="Marcia Moraes" userId="c9c67e8a-58e2-4733-9a1c-5d44fec4775b" providerId="ADAL" clId="{CF9B6DE9-563F-497F-8B3B-C591D75A312C}" dt="2023-03-01T01:26:38.779" v="262"/>
-          <ac:spMkLst>
-            <pc:docMk/>
-            <pc:sldMk cId="4259123250" sldId="258"/>
-            <ac:spMk id="8" creationId="{49EADE3C-DE69-F74B-9A8A-62754D809272}"/>
-          </ac:spMkLst>
-        </pc:spChg>
-      </pc:sldChg>
-      <pc:sldChg chg="addSp delSp modSp delAnim modAnim">
-        <pc:chgData name="Marcia Moraes" userId="c9c67e8a-58e2-4733-9a1c-5d44fec4775b" providerId="ADAL" clId="{CF9B6DE9-563F-497F-8B3B-C591D75A312C}" dt="2023-03-01T01:35:34.859" v="383"/>
-        <pc:sldMkLst>
-          <pc:docMk/>
-          <pc:sldMk cId="2034861186" sldId="259"/>
-        </pc:sldMkLst>
-        <pc:spChg chg="mod">
-          <ac:chgData name="Marcia Moraes" userId="c9c67e8a-58e2-4733-9a1c-5d44fec4775b" providerId="ADAL" clId="{CF9B6DE9-563F-497F-8B3B-C591D75A312C}" dt="2023-03-01T01:22:03.228" v="152" actId="20577"/>
-          <ac:spMkLst>
-            <pc:docMk/>
-            <pc:sldMk cId="2034861186" sldId="259"/>
-            <ac:spMk id="2" creationId="{86C59E2E-1F56-2646-998C-4D9302402C1C}"/>
-          </ac:spMkLst>
-        </pc:spChg>
-        <pc:spChg chg="mod">
-          <ac:chgData name="Marcia Moraes" userId="c9c67e8a-58e2-4733-9a1c-5d44fec4775b" providerId="ADAL" clId="{CF9B6DE9-563F-497F-8B3B-C591D75A312C}" dt="2023-03-01T01:29:26.930" v="304" actId="255"/>
-          <ac:spMkLst>
-            <pc:docMk/>
-            <pc:sldMk cId="2034861186" sldId="259"/>
-            <ac:spMk id="3" creationId="{4041A6DE-C0FC-A04D-9E80-9EDD35A1AB19}"/>
-          </ac:spMkLst>
-        </pc:spChg>
-        <pc:spChg chg="mod">
-          <ac:chgData name="Marcia Moraes" userId="c9c67e8a-58e2-4733-9a1c-5d44fec4775b" providerId="ADAL" clId="{CF9B6DE9-563F-497F-8B3B-C591D75A312C}" dt="2023-03-01T01:29:43.539" v="306" actId="1076"/>
-          <ac:spMkLst>
-            <pc:docMk/>
-            <pc:sldMk cId="2034861186" sldId="259"/>
-            <ac:spMk id="4" creationId="{A80C1401-75D6-8A4C-8530-C4DA01241CE0}"/>
-          </ac:spMkLst>
-        </pc:spChg>
-        <pc:spChg chg="del mod">
-          <ac:chgData name="Marcia Moraes" userId="c9c67e8a-58e2-4733-9a1c-5d44fec4775b" providerId="ADAL" clId="{CF9B6DE9-563F-497F-8B3B-C591D75A312C}" dt="2023-03-01T01:22:42.093" v="259" actId="478"/>
-          <ac:spMkLst>
-            <pc:docMk/>
-            <pc:sldMk cId="2034861186" sldId="259"/>
-            <ac:spMk id="5" creationId="{322BAE42-E0E6-D94B-B3A3-AFA77A8B5829}"/>
-          </ac:spMkLst>
-        </pc:spChg>
-        <pc:spChg chg="del mod">
-          <ac:chgData name="Marcia Moraes" userId="c9c67e8a-58e2-4733-9a1c-5d44fec4775b" providerId="ADAL" clId="{CF9B6DE9-563F-497F-8B3B-C591D75A312C}" dt="2023-03-01T01:23:01.749" v="260" actId="478"/>
-          <ac:spMkLst>
-            <pc:docMk/>
-            <pc:sldMk cId="2034861186" sldId="259"/>
-            <ac:spMk id="6" creationId="{E1AE345C-19BD-DE49-9F4F-E0BE33C5D631}"/>
-          </ac:spMkLst>
-        </pc:spChg>
-        <pc:spChg chg="del">
-          <ac:chgData name="Marcia Moraes" userId="c9c67e8a-58e2-4733-9a1c-5d44fec4775b" providerId="ADAL" clId="{CF9B6DE9-563F-497F-8B3B-C591D75A312C}" dt="2023-03-01T01:18:53.809" v="72" actId="478"/>
-          <ac:spMkLst>
-            <pc:docMk/>
-            <pc:sldMk cId="2034861186" sldId="259"/>
-            <ac:spMk id="7" creationId="{2A9EFD38-3360-DD4C-BAE9-563B8481A889}"/>
-          </ac:spMkLst>
-        </pc:spChg>
-        <pc:spChg chg="del">
-          <ac:chgData name="Marcia Moraes" userId="c9c67e8a-58e2-4733-9a1c-5d44fec4775b" providerId="ADAL" clId="{CF9B6DE9-563F-497F-8B3B-C591D75A312C}" dt="2023-03-01T01:18:53.809" v="72" actId="478"/>
-          <ac:spMkLst>
-            <pc:docMk/>
-            <pc:sldMk cId="2034861186" sldId="259"/>
-            <ac:spMk id="8" creationId="{405CBA7F-1EA5-8D47-B077-D065C25F334B}"/>
-          </ac:spMkLst>
-        </pc:spChg>
-        <pc:spChg chg="del">
-          <ac:chgData name="Marcia Moraes" userId="c9c67e8a-58e2-4733-9a1c-5d44fec4775b" providerId="ADAL" clId="{CF9B6DE9-563F-497F-8B3B-C591D75A312C}" dt="2023-03-01T01:18:53.809" v="72" actId="478"/>
-          <ac:spMkLst>
-            <pc:docMk/>
-            <pc:sldMk cId="2034861186" sldId="259"/>
-            <ac:spMk id="9" creationId="{B059BF1B-4E60-504B-A574-5710171F05BC}"/>
-          </ac:spMkLst>
-        </pc:spChg>
-        <pc:spChg chg="del">
-          <ac:chgData name="Marcia Moraes" userId="c9c67e8a-58e2-4733-9a1c-5d44fec4775b" providerId="ADAL" clId="{CF9B6DE9-563F-497F-8B3B-C591D75A312C}" dt="2023-03-01T01:18:53.809" v="72" actId="478"/>
-          <ac:spMkLst>
-            <pc:docMk/>
-            <pc:sldMk cId="2034861186" sldId="259"/>
-            <ac:spMk id="10" creationId="{CA5B8BC1-6EBE-9347-B417-A4FC02D6BE2E}"/>
-          </ac:spMkLst>
-        </pc:spChg>
-        <pc:spChg chg="del">
-          <ac:chgData name="Marcia Moraes" userId="c9c67e8a-58e2-4733-9a1c-5d44fec4775b" providerId="ADAL" clId="{CF9B6DE9-563F-497F-8B3B-C591D75A312C}" dt="2023-03-01T01:18:53.809" v="72" actId="478"/>
-          <ac:spMkLst>
-            <pc:docMk/>
-            <pc:sldMk cId="2034861186" sldId="259"/>
-            <ac:spMk id="11" creationId="{FF5FD851-B386-F144-A19C-09579FE008E4}"/>
-          </ac:spMkLst>
-        </pc:spChg>
-        <pc:spChg chg="del">
-          <ac:chgData name="Marcia Moraes" userId="c9c67e8a-58e2-4733-9a1c-5d44fec4775b" providerId="ADAL" clId="{CF9B6DE9-563F-497F-8B3B-C591D75A312C}" dt="2023-03-01T01:18:53.809" v="72" actId="478"/>
-          <ac:spMkLst>
-            <pc:docMk/>
-            <pc:sldMk cId="2034861186" sldId="259"/>
-            <ac:spMk id="12" creationId="{5E7DCACE-2C31-0341-A10D-194C6C13F921}"/>
-          </ac:spMkLst>
-        </pc:spChg>
-        <pc:spChg chg="del">
-          <ac:chgData name="Marcia Moraes" userId="c9c67e8a-58e2-4733-9a1c-5d44fec4775b" providerId="ADAL" clId="{CF9B6DE9-563F-497F-8B3B-C591D75A312C}" dt="2023-03-01T01:18:53.809" v="72" actId="478"/>
-          <ac:spMkLst>
-            <pc:docMk/>
-            <pc:sldMk cId="2034861186" sldId="259"/>
-            <ac:spMk id="13" creationId="{BF3DC5FB-1F9A-EC44-BB18-E87DCC67B374}"/>
-          </ac:spMkLst>
-        </pc:spChg>
-        <pc:spChg chg="add mod">
-          <ac:chgData name="Marcia Moraes" userId="c9c67e8a-58e2-4733-9a1c-5d44fec4775b" providerId="ADAL" clId="{CF9B6DE9-563F-497F-8B3B-C591D75A312C}" dt="2023-03-01T01:30:28.522" v="321" actId="1076"/>
-          <ac:spMkLst>
-            <pc:docMk/>
-            <pc:sldMk cId="2034861186" sldId="259"/>
-            <ac:spMk id="14" creationId="{918196E8-1AF5-4AB5-9743-A345032F6079}"/>
-          </ac:spMkLst>
-        </pc:spChg>
-        <pc:spChg chg="del">
-          <ac:chgData name="Marcia Moraes" userId="c9c67e8a-58e2-4733-9a1c-5d44fec4775b" providerId="ADAL" clId="{CF9B6DE9-563F-497F-8B3B-C591D75A312C}" dt="2023-03-01T01:18:53.809" v="72" actId="478"/>
-          <ac:spMkLst>
-            <pc:docMk/>
-            <pc:sldMk cId="2034861186" sldId="259"/>
-            <ac:spMk id="15" creationId="{6667CFF0-C674-2A41-A1E2-8D470EE53060}"/>
-          </ac:spMkLst>
-        </pc:spChg>
-        <pc:spChg chg="del">
-          <ac:chgData name="Marcia Moraes" userId="c9c67e8a-58e2-4733-9a1c-5d44fec4775b" providerId="ADAL" clId="{CF9B6DE9-563F-497F-8B3B-C591D75A312C}" dt="2023-03-01T01:18:53.809" v="72" actId="478"/>
-          <ac:spMkLst>
-            <pc:docMk/>
-            <pc:sldMk cId="2034861186" sldId="259"/>
-            <ac:spMk id="16" creationId="{C516F16F-0B5A-B84D-848D-D44777C07BFA}"/>
-          </ac:spMkLst>
-        </pc:spChg>
-        <pc:spChg chg="del">
-          <ac:chgData name="Marcia Moraes" userId="c9c67e8a-58e2-4733-9a1c-5d44fec4775b" providerId="ADAL" clId="{CF9B6DE9-563F-497F-8B3B-C591D75A312C}" dt="2023-03-01T01:18:53.809" v="72" actId="478"/>
-          <ac:spMkLst>
-            <pc:docMk/>
-            <pc:sldMk cId="2034861186" sldId="259"/>
-            <ac:spMk id="17" creationId="{4C7AAD8B-FAE3-D345-850F-8ECA035761E0}"/>
-          </ac:spMkLst>
-        </pc:spChg>
-        <pc:spChg chg="del">
-          <ac:chgData name="Marcia Moraes" userId="c9c67e8a-58e2-4733-9a1c-5d44fec4775b" providerId="ADAL" clId="{CF9B6DE9-563F-497F-8B3B-C591D75A312C}" dt="2023-03-01T01:18:53.809" v="72" actId="478"/>
-          <ac:spMkLst>
-            <pc:docMk/>
-            <pc:sldMk cId="2034861186" sldId="259"/>
-            <ac:spMk id="18" creationId="{E6EFA897-F6B7-E948-B09C-8BD4CCF79CE5}"/>
-          </ac:spMkLst>
-        </pc:spChg>
-        <pc:spChg chg="del">
-          <ac:chgData name="Marcia Moraes" userId="c9c67e8a-58e2-4733-9a1c-5d44fec4775b" providerId="ADAL" clId="{CF9B6DE9-563F-497F-8B3B-C591D75A312C}" dt="2023-03-01T01:18:53.809" v="72" actId="478"/>
-          <ac:spMkLst>
-            <pc:docMk/>
-            <pc:sldMk cId="2034861186" sldId="259"/>
-            <ac:spMk id="19" creationId="{5188F7B4-768F-6446-BA0E-243B2376CEC2}"/>
-          </ac:spMkLst>
-        </pc:spChg>
-        <pc:spChg chg="del">
-          <ac:chgData name="Marcia Moraes" userId="c9c67e8a-58e2-4733-9a1c-5d44fec4775b" providerId="ADAL" clId="{CF9B6DE9-563F-497F-8B3B-C591D75A312C}" dt="2023-03-01T01:18:53.809" v="72" actId="478"/>
-          <ac:spMkLst>
-            <pc:docMk/>
-            <pc:sldMk cId="2034861186" sldId="259"/>
-            <ac:spMk id="20" creationId="{A4C7F39B-E117-4A4B-BABA-8D9A0574C80D}"/>
-          </ac:spMkLst>
-        </pc:spChg>
-        <pc:spChg chg="del">
-          <ac:chgData name="Marcia Moraes" userId="c9c67e8a-58e2-4733-9a1c-5d44fec4775b" providerId="ADAL" clId="{CF9B6DE9-563F-497F-8B3B-C591D75A312C}" dt="2023-03-01T01:18:53.809" v="72" actId="478"/>
-          <ac:spMkLst>
-            <pc:docMk/>
-            <pc:sldMk cId="2034861186" sldId="259"/>
-            <ac:spMk id="21" creationId="{0F51BC25-5AAC-AE4D-AB3B-9750E084AA71}"/>
-          </ac:spMkLst>
-        </pc:spChg>
-        <pc:spChg chg="del">
-          <ac:chgData name="Marcia Moraes" userId="c9c67e8a-58e2-4733-9a1c-5d44fec4775b" providerId="ADAL" clId="{CF9B6DE9-563F-497F-8B3B-C591D75A312C}" dt="2023-03-01T01:18:53.809" v="72" actId="478"/>
-          <ac:spMkLst>
-            <pc:docMk/>
-            <pc:sldMk cId="2034861186" sldId="259"/>
-            <ac:spMk id="22" creationId="{A4C180DF-F59E-6140-915D-0CB6E117C095}"/>
-          </ac:spMkLst>
-        </pc:spChg>
-        <pc:spChg chg="del">
-          <ac:chgData name="Marcia Moraes" userId="c9c67e8a-58e2-4733-9a1c-5d44fec4775b" providerId="ADAL" clId="{CF9B6DE9-563F-497F-8B3B-C591D75A312C}" dt="2023-03-01T01:18:53.809" v="72" actId="478"/>
-          <ac:spMkLst>
-            <pc:docMk/>
-            <pc:sldMk cId="2034861186" sldId="259"/>
-            <ac:spMk id="23" creationId="{43F3D518-240A-5D4F-B0DC-9BD495BC9C89}"/>
-          </ac:spMkLst>
-        </pc:spChg>
-        <pc:spChg chg="del">
-          <ac:chgData name="Marcia Moraes" userId="c9c67e8a-58e2-4733-9a1c-5d44fec4775b" providerId="ADAL" clId="{CF9B6DE9-563F-497F-8B3B-C591D75A312C}" dt="2023-03-01T01:18:53.809" v="72" actId="478"/>
-          <ac:spMkLst>
-            <pc:docMk/>
-            <pc:sldMk cId="2034861186" sldId="259"/>
-            <ac:spMk id="24" creationId="{F981B6E1-8D80-D84D-89C6-7FB334CC2962}"/>
-          </ac:spMkLst>
-        </pc:spChg>
-        <pc:spChg chg="del">
-          <ac:chgData name="Marcia Moraes" userId="c9c67e8a-58e2-4733-9a1c-5d44fec4775b" providerId="ADAL" clId="{CF9B6DE9-563F-497F-8B3B-C591D75A312C}" dt="2023-03-01T01:18:53.809" v="72" actId="478"/>
-          <ac:spMkLst>
-            <pc:docMk/>
-            <pc:sldMk cId="2034861186" sldId="259"/>
-            <ac:spMk id="25" creationId="{D95DDCBA-8DFF-544F-8087-80A4A82825A0}"/>
-          </ac:spMkLst>
-        </pc:spChg>
-        <pc:spChg chg="del">
-          <ac:chgData name="Marcia Moraes" userId="c9c67e8a-58e2-4733-9a1c-5d44fec4775b" providerId="ADAL" clId="{CF9B6DE9-563F-497F-8B3B-C591D75A312C}" dt="2023-03-01T01:18:53.809" v="72" actId="478"/>
-          <ac:spMkLst>
-            <pc:docMk/>
-            <pc:sldMk cId="2034861186" sldId="259"/>
-            <ac:spMk id="26" creationId="{B74A9E0F-1E4E-AD40-AB15-41C8870E3A85}"/>
-          </ac:spMkLst>
-        </pc:spChg>
-        <pc:spChg chg="del">
-          <ac:chgData name="Marcia Moraes" userId="c9c67e8a-58e2-4733-9a1c-5d44fec4775b" providerId="ADAL" clId="{CF9B6DE9-563F-497F-8B3B-C591D75A312C}" dt="2023-03-01T01:18:53.809" v="72" actId="478"/>
-          <ac:spMkLst>
-            <pc:docMk/>
-            <pc:sldMk cId="2034861186" sldId="259"/>
-            <ac:spMk id="27" creationId="{7E9E1DF5-F544-E248-8147-A390F2F80026}"/>
-          </ac:spMkLst>
-        </pc:spChg>
-        <pc:spChg chg="del">
-          <ac:chgData name="Marcia Moraes" userId="c9c67e8a-58e2-4733-9a1c-5d44fec4775b" providerId="ADAL" clId="{CF9B6DE9-563F-497F-8B3B-C591D75A312C}" dt="2023-03-01T01:19:07.310" v="74" actId="478"/>
-          <ac:spMkLst>
-            <pc:docMk/>
-            <pc:sldMk cId="2034861186" sldId="259"/>
-            <ac:spMk id="28" creationId="{E437FF31-ADAA-1A4C-8A62-3A024936411C}"/>
-          </ac:spMkLst>
-        </pc:spChg>
-        <pc:spChg chg="del">
-          <ac:chgData name="Marcia Moraes" userId="c9c67e8a-58e2-4733-9a1c-5d44fec4775b" providerId="ADAL" clId="{CF9B6DE9-563F-497F-8B3B-C591D75A312C}" dt="2023-03-01T01:19:07.310" v="74" actId="478"/>
-          <ac:spMkLst>
-            <pc:docMk/>
-            <pc:sldMk cId="2034861186" sldId="259"/>
-            <ac:spMk id="29" creationId="{4C072AB3-D45F-6E4B-890C-6004EEF6C851}"/>
-          </ac:spMkLst>
-        </pc:spChg>
-        <pc:spChg chg="del">
-          <ac:chgData name="Marcia Moraes" userId="c9c67e8a-58e2-4733-9a1c-5d44fec4775b" providerId="ADAL" clId="{CF9B6DE9-563F-497F-8B3B-C591D75A312C}" dt="2023-03-01T01:19:07.310" v="74" actId="478"/>
-          <ac:spMkLst>
-            <pc:docMk/>
-            <pc:sldMk cId="2034861186" sldId="259"/>
-            <ac:spMk id="30" creationId="{416B1507-3D33-7F4B-9A83-A5634F077F4B}"/>
-          </ac:spMkLst>
-        </pc:spChg>
-        <pc:spChg chg="del">
-          <ac:chgData name="Marcia Moraes" userId="c9c67e8a-58e2-4733-9a1c-5d44fec4775b" providerId="ADAL" clId="{CF9B6DE9-563F-497F-8B3B-C591D75A312C}" dt="2023-03-01T01:19:07.310" v="74" actId="478"/>
-          <ac:spMkLst>
-            <pc:docMk/>
-            <pc:sldMk cId="2034861186" sldId="259"/>
-            <ac:spMk id="31" creationId="{DF4D9B10-D315-9046-AD26-42AAD7207B76}"/>
-          </ac:spMkLst>
-        </pc:spChg>
-        <pc:spChg chg="del">
-          <ac:chgData name="Marcia Moraes" userId="c9c67e8a-58e2-4733-9a1c-5d44fec4775b" providerId="ADAL" clId="{CF9B6DE9-563F-497F-8B3B-C591D75A312C}" dt="2023-03-01T01:19:07.310" v="74" actId="478"/>
-          <ac:spMkLst>
-            <pc:docMk/>
-            <pc:sldMk cId="2034861186" sldId="259"/>
-            <ac:spMk id="32" creationId="{23A347AC-C7CE-3745-8F7E-95117A00D2D5}"/>
-          </ac:spMkLst>
-        </pc:spChg>
-        <pc:spChg chg="add mod">
-          <ac:chgData name="Marcia Moraes" userId="c9c67e8a-58e2-4733-9a1c-5d44fec4775b" providerId="ADAL" clId="{CF9B6DE9-563F-497F-8B3B-C591D75A312C}" dt="2023-03-01T01:29:40.251" v="305" actId="1076"/>
-          <ac:spMkLst>
-            <pc:docMk/>
-            <pc:sldMk cId="2034861186" sldId="259"/>
-            <ac:spMk id="33" creationId="{0ACB912E-C6E9-4F28-B832-96F0DB71FA38}"/>
-          </ac:spMkLst>
-        </pc:spChg>
-        <pc:spChg chg="add mod">
-          <ac:chgData name="Marcia Moraes" userId="c9c67e8a-58e2-4733-9a1c-5d44fec4775b" providerId="ADAL" clId="{CF9B6DE9-563F-497F-8B3B-C591D75A312C}" dt="2023-03-01T01:30:02.952" v="312" actId="255"/>
-          <ac:spMkLst>
-            <pc:docMk/>
-            <pc:sldMk cId="2034861186" sldId="259"/>
-            <ac:spMk id="34" creationId="{148955D7-3B78-4105-A8B7-39B7A5A1EDA0}"/>
-          </ac:spMkLst>
-        </pc:spChg>
-        <pc:spChg chg="add mod">
-          <ac:chgData name="Marcia Moraes" userId="c9c67e8a-58e2-4733-9a1c-5d44fec4775b" providerId="ADAL" clId="{CF9B6DE9-563F-497F-8B3B-C591D75A312C}" dt="2023-03-01T01:30:09.610" v="316" actId="20577"/>
-          <ac:spMkLst>
-            <pc:docMk/>
-            <pc:sldMk cId="2034861186" sldId="259"/>
-            <ac:spMk id="35" creationId="{B87E00FC-ED47-4EC0-BA5F-6853C74EC649}"/>
-          </ac:spMkLst>
-        </pc:spChg>
-        <pc:spChg chg="add mod">
-          <ac:chgData name="Marcia Moraes" userId="c9c67e8a-58e2-4733-9a1c-5d44fec4775b" providerId="ADAL" clId="{CF9B6DE9-563F-497F-8B3B-C591D75A312C}" dt="2023-03-01T01:30:32.943" v="322" actId="1076"/>
-          <ac:spMkLst>
-            <pc:docMk/>
-            <pc:sldMk cId="2034861186" sldId="259"/>
-            <ac:spMk id="36" creationId="{A5864211-9858-41F3-80EE-76D3E7BE555E}"/>
-          </ac:spMkLst>
-        </pc:spChg>
-      </pc:sldChg>
-      <pc:sldChg chg="addSp delSp modSp ord delAnim modAnim">
-        <pc:chgData name="Marcia Moraes" userId="c9c67e8a-58e2-4733-9a1c-5d44fec4775b" providerId="ADAL" clId="{CF9B6DE9-563F-497F-8B3B-C591D75A312C}" dt="2023-03-01T03:23:53.833" v="1019" actId="5793"/>
-        <pc:sldMkLst>
-          <pc:docMk/>
-          <pc:sldMk cId="1378285814" sldId="260"/>
-        </pc:sldMkLst>
-        <pc:spChg chg="mod">
-          <ac:chgData name="Marcia Moraes" userId="c9c67e8a-58e2-4733-9a1c-5d44fec4775b" providerId="ADAL" clId="{CF9B6DE9-563F-497F-8B3B-C591D75A312C}" dt="2023-03-01T03:11:18.560" v="877" actId="14100"/>
-          <ac:spMkLst>
-            <pc:docMk/>
-            <pc:sldMk cId="1378285814" sldId="260"/>
-            <ac:spMk id="3" creationId="{A532DEDA-9414-0A41-B377-DBD94A1F0E75}"/>
-          </ac:spMkLst>
-        </pc:spChg>
-        <pc:spChg chg="mod">
-          <ac:chgData name="Marcia Moraes" userId="c9c67e8a-58e2-4733-9a1c-5d44fec4775b" providerId="ADAL" clId="{CF9B6DE9-563F-497F-8B3B-C591D75A312C}" dt="2023-03-01T03:00:03.443" v="629" actId="255"/>
-          <ac:spMkLst>
-            <pc:docMk/>
-            <pc:sldMk cId="1378285814" sldId="260"/>
-            <ac:spMk id="4" creationId="{220DC209-9736-5C43-A4E6-0C23A367239F}"/>
-          </ac:spMkLst>
-        </pc:spChg>
-        <pc:spChg chg="mod">
-          <ac:chgData name="Marcia Moraes" userId="c9c67e8a-58e2-4733-9a1c-5d44fec4775b" providerId="ADAL" clId="{CF9B6DE9-563F-497F-8B3B-C591D75A312C}" dt="2023-03-01T03:00:10.817" v="630" actId="14100"/>
-          <ac:spMkLst>
-            <pc:docMk/>
-            <pc:sldMk cId="1378285814" sldId="260"/>
-            <ac:spMk id="5" creationId="{DC652986-60D7-D04D-B220-8D3C643C5819}"/>
-          </ac:spMkLst>
-        </pc:spChg>
-        <pc:spChg chg="del">
-          <ac:chgData name="Marcia Moraes" userId="c9c67e8a-58e2-4733-9a1c-5d44fec4775b" providerId="ADAL" clId="{CF9B6DE9-563F-497F-8B3B-C591D75A312C}" dt="2023-03-01T02:46:37.877" v="615" actId="478"/>
-          <ac:spMkLst>
-            <pc:docMk/>
-            <pc:sldMk cId="1378285814" sldId="260"/>
-            <ac:spMk id="6" creationId="{AE630439-DD3A-5842-AE4F-84D0C8D653D7}"/>
-          </ac:spMkLst>
-        </pc:spChg>
-        <pc:spChg chg="add mod">
-          <ac:chgData name="Marcia Moraes" userId="c9c67e8a-58e2-4733-9a1c-5d44fec4775b" providerId="ADAL" clId="{CF9B6DE9-563F-497F-8B3B-C591D75A312C}" dt="2023-03-01T03:00:58.580" v="667" actId="1076"/>
-          <ac:spMkLst>
-            <pc:docMk/>
-            <pc:sldMk cId="1378285814" sldId="260"/>
-            <ac:spMk id="7" creationId="{0A8A31F9-D057-451E-A4CA-7A74DE54FBC0}"/>
-          </ac:spMkLst>
-        </pc:spChg>
-        <pc:spChg chg="add mod">
-          <ac:chgData name="Marcia Moraes" userId="c9c67e8a-58e2-4733-9a1c-5d44fec4775b" providerId="ADAL" clId="{CF9B6DE9-563F-497F-8B3B-C591D75A312C}" dt="2023-03-01T03:23:52.622" v="1018" actId="5793"/>
-          <ac:spMkLst>
-            <pc:docMk/>
-            <pc:sldMk cId="1378285814" sldId="260"/>
-            <ac:spMk id="8" creationId="{A786E288-24C2-4673-8FC2-3103CC47C7BD}"/>
-          </ac:spMkLst>
-        </pc:spChg>
-      </pc:sldChg>
-      <pc:sldChg chg="modSp ord">
-        <pc:chgData name="Marcia Moraes" userId="c9c67e8a-58e2-4733-9a1c-5d44fec4775b" providerId="ADAL" clId="{CF9B6DE9-563F-497F-8B3B-C591D75A312C}" dt="2023-03-01T03:24:44.507" v="1026" actId="1076"/>
-        <pc:sldMkLst>
-          <pc:docMk/>
-          <pc:sldMk cId="4081044051" sldId="261"/>
-        </pc:sldMkLst>
-        <pc:spChg chg="mod">
-          <ac:chgData name="Marcia Moraes" userId="c9c67e8a-58e2-4733-9a1c-5d44fec4775b" providerId="ADAL" clId="{CF9B6DE9-563F-497F-8B3B-C591D75A312C}" dt="2023-03-01T03:02:54.728" v="787" actId="1076"/>
-          <ac:spMkLst>
-            <pc:docMk/>
-            <pc:sldMk cId="4081044051" sldId="261"/>
-            <ac:spMk id="3" creationId="{9EBD3E95-5EDA-0C42-8688-123BE37EC608}"/>
-          </ac:spMkLst>
-        </pc:spChg>
-        <pc:spChg chg="mod">
-          <ac:chgData name="Marcia Moraes" userId="c9c67e8a-58e2-4733-9a1c-5d44fec4775b" providerId="ADAL" clId="{CF9B6DE9-563F-497F-8B3B-C591D75A312C}" dt="2023-03-01T03:24:30.965" v="1022" actId="1076"/>
-          <ac:spMkLst>
-            <pc:docMk/>
-            <pc:sldMk cId="4081044051" sldId="261"/>
-            <ac:spMk id="4" creationId="{F4C21DEF-FFE6-7846-8B15-F8294C302A46}"/>
-          </ac:spMkLst>
-        </pc:spChg>
-        <pc:spChg chg="mod">
-          <ac:chgData name="Marcia Moraes" userId="c9c67e8a-58e2-4733-9a1c-5d44fec4775b" providerId="ADAL" clId="{CF9B6DE9-563F-497F-8B3B-C591D75A312C}" dt="2023-03-01T03:24:34.686" v="1023" actId="1076"/>
-          <ac:spMkLst>
-            <pc:docMk/>
-            <pc:sldMk cId="4081044051" sldId="261"/>
-            <ac:spMk id="5" creationId="{18A788EF-078B-C547-81F9-CA02C1169A20}"/>
-          </ac:spMkLst>
-        </pc:spChg>
-        <pc:spChg chg="mod">
-          <ac:chgData name="Marcia Moraes" userId="c9c67e8a-58e2-4733-9a1c-5d44fec4775b" providerId="ADAL" clId="{CF9B6DE9-563F-497F-8B3B-C591D75A312C}" dt="2023-03-01T03:24:42.682" v="1025" actId="1076"/>
-          <ac:spMkLst>
-            <pc:docMk/>
-            <pc:sldMk cId="4081044051" sldId="261"/>
-            <ac:spMk id="6" creationId="{4F117C7A-5AD9-BB42-AC66-5DEA244CC162}"/>
-          </ac:spMkLst>
-        </pc:spChg>
-        <pc:spChg chg="mod">
-          <ac:chgData name="Marcia Moraes" userId="c9c67e8a-58e2-4733-9a1c-5d44fec4775b" providerId="ADAL" clId="{CF9B6DE9-563F-497F-8B3B-C591D75A312C}" dt="2023-03-01T03:24:44.507" v="1026" actId="1076"/>
-          <ac:spMkLst>
-            <pc:docMk/>
-            <pc:sldMk cId="4081044051" sldId="261"/>
-            <ac:spMk id="7" creationId="{9B78E545-AACE-F448-BFEE-45B3ADEE260E}"/>
-          </ac:spMkLst>
-        </pc:spChg>
-      </pc:sldChg>
-      <pc:sldChg chg="modSp">
-        <pc:chgData name="Marcia Moraes" userId="c9c67e8a-58e2-4733-9a1c-5d44fec4775b" providerId="ADAL" clId="{CF9B6DE9-563F-497F-8B3B-C591D75A312C}" dt="2023-03-01T02:33:43.797" v="452" actId="20577"/>
-        <pc:sldMkLst>
-          <pc:docMk/>
-          <pc:sldMk cId="2269088149" sldId="262"/>
-        </pc:sldMkLst>
-        <pc:spChg chg="mod">
-          <ac:chgData name="Marcia Moraes" userId="c9c67e8a-58e2-4733-9a1c-5d44fec4775b" providerId="ADAL" clId="{CF9B6DE9-563F-497F-8B3B-C591D75A312C}" dt="2023-03-01T02:32:42.075" v="438" actId="20577"/>
-          <ac:spMkLst>
-            <pc:docMk/>
-            <pc:sldMk cId="2269088149" sldId="262"/>
-            <ac:spMk id="4" creationId="{FAAE6F2E-172B-F74B-A63E-FBEE9F584404}"/>
-          </ac:spMkLst>
-        </pc:spChg>
-        <pc:spChg chg="mod">
-          <ac:chgData name="Marcia Moraes" userId="c9c67e8a-58e2-4733-9a1c-5d44fec4775b" providerId="ADAL" clId="{CF9B6DE9-563F-497F-8B3B-C591D75A312C}" dt="2023-03-01T02:33:43.797" v="452" actId="20577"/>
-          <ac:spMkLst>
-            <pc:docMk/>
-            <pc:sldMk cId="2269088149" sldId="262"/>
-            <ac:spMk id="5" creationId="{DADDAA0C-CB62-1049-AF60-5356E6C65DB6}"/>
-          </ac:spMkLst>
-        </pc:spChg>
-      </pc:sldChg>
-      <pc:sldChg chg="del ord">
-        <pc:chgData name="Marcia Moraes" userId="c9c67e8a-58e2-4733-9a1c-5d44fec4775b" providerId="ADAL" clId="{CF9B6DE9-563F-497F-8B3B-C591D75A312C}" dt="2023-03-01T03:22:02.713" v="895" actId="2696"/>
-        <pc:sldMkLst>
-          <pc:docMk/>
-          <pc:sldMk cId="2773136670" sldId="263"/>
-        </pc:sldMkLst>
-      </pc:sldChg>
-      <pc:sldChg chg="modSp del">
-        <pc:chgData name="Marcia Moraes" userId="c9c67e8a-58e2-4733-9a1c-5d44fec4775b" providerId="ADAL" clId="{CF9B6DE9-563F-497F-8B3B-C591D75A312C}" dt="2023-03-01T03:19:26.197" v="891" actId="2696"/>
-        <pc:sldMkLst>
-          <pc:docMk/>
-          <pc:sldMk cId="1005821696" sldId="264"/>
-        </pc:sldMkLst>
-        <pc:spChg chg="mod">
-          <ac:chgData name="Marcia Moraes" userId="c9c67e8a-58e2-4733-9a1c-5d44fec4775b" providerId="ADAL" clId="{CF9B6DE9-563F-497F-8B3B-C591D75A312C}" dt="2023-03-01T03:19:23.618" v="890" actId="6549"/>
-          <ac:spMkLst>
-            <pc:docMk/>
-            <pc:sldMk cId="1005821696" sldId="264"/>
-            <ac:spMk id="3" creationId="{A532DEDA-9414-0A41-B377-DBD94A1F0E75}"/>
-          </ac:spMkLst>
-        </pc:spChg>
-      </pc:sldChg>
-      <pc:sldChg chg="modSp del">
-        <pc:chgData name="Marcia Moraes" userId="c9c67e8a-58e2-4733-9a1c-5d44fec4775b" providerId="ADAL" clId="{CF9B6DE9-563F-497F-8B3B-C591D75A312C}" dt="2023-03-01T03:22:03.830" v="896" actId="2696"/>
-        <pc:sldMkLst>
-          <pc:docMk/>
-          <pc:sldMk cId="2860398301" sldId="265"/>
-        </pc:sldMkLst>
-        <pc:spChg chg="mod">
-          <ac:chgData name="Marcia Moraes" userId="c9c67e8a-58e2-4733-9a1c-5d44fec4775b" providerId="ADAL" clId="{CF9B6DE9-563F-497F-8B3B-C591D75A312C}" dt="2023-03-01T03:19:34.791" v="892"/>
-          <ac:spMkLst>
-            <pc:docMk/>
-            <pc:sldMk cId="2860398301" sldId="265"/>
-            <ac:spMk id="3" creationId="{A532DEDA-9414-0A41-B377-DBD94A1F0E75}"/>
-          </ac:spMkLst>
-        </pc:spChg>
-      </pc:sldChg>
-      <pc:sldChg chg="del">
-        <pc:chgData name="Marcia Moraes" userId="c9c67e8a-58e2-4733-9a1c-5d44fec4775b" providerId="ADAL" clId="{CF9B6DE9-563F-497F-8B3B-C591D75A312C}" dt="2023-03-01T01:15:11.738" v="22" actId="2696"/>
-        <pc:sldMkLst>
-          <pc:docMk/>
-          <pc:sldMk cId="926474781" sldId="266"/>
-        </pc:sldMkLst>
-      </pc:sldChg>
-      <pc:sldChg chg="addSp delSp modSp">
-        <pc:chgData name="Marcia Moraes" userId="c9c67e8a-58e2-4733-9a1c-5d44fec4775b" providerId="ADAL" clId="{CF9B6DE9-563F-497F-8B3B-C591D75A312C}" dt="2023-03-01T01:14:28.148" v="21" actId="1076"/>
-        <pc:sldMkLst>
-          <pc:docMk/>
-          <pc:sldMk cId="2571368551" sldId="267"/>
-        </pc:sldMkLst>
-        <pc:spChg chg="add mod">
-          <ac:chgData name="Marcia Moraes" userId="c9c67e8a-58e2-4733-9a1c-5d44fec4775b" providerId="ADAL" clId="{CF9B6DE9-563F-497F-8B3B-C591D75A312C}" dt="2023-03-01T01:14:28.148" v="21" actId="1076"/>
-          <ac:spMkLst>
-            <pc:docMk/>
-            <pc:sldMk cId="2571368551" sldId="267"/>
-            <ac:spMk id="2" creationId="{84CD52E7-9878-46B0-B322-12FDC9581986}"/>
-          </ac:spMkLst>
-        </pc:spChg>
-        <pc:picChg chg="add del mod">
-          <ac:chgData name="Marcia Moraes" userId="c9c67e8a-58e2-4733-9a1c-5d44fec4775b" providerId="ADAL" clId="{CF9B6DE9-563F-497F-8B3B-C591D75A312C}" dt="2023-03-01T01:14:06.523" v="17" actId="478"/>
-          <ac:picMkLst>
-            <pc:docMk/>
-            <pc:sldMk cId="2571368551" sldId="267"/>
-            <ac:picMk id="3" creationId="{868AE9B2-6CD5-4D8A-8279-1176820C9749}"/>
-          </ac:picMkLst>
-        </pc:picChg>
-        <pc:picChg chg="add del mod">
-          <ac:chgData name="Marcia Moraes" userId="c9c67e8a-58e2-4733-9a1c-5d44fec4775b" providerId="ADAL" clId="{CF9B6DE9-563F-497F-8B3B-C591D75A312C}" dt="2023-03-01T01:10:48.246" v="10" actId="478"/>
-          <ac:picMkLst>
-            <pc:docMk/>
-            <pc:sldMk cId="2571368551" sldId="267"/>
-            <ac:picMk id="1026" creationId="{A611A38E-75A2-4903-8791-0352DBADDB53}"/>
-          </ac:picMkLst>
-        </pc:picChg>
-        <pc:picChg chg="add del">
-          <ac:chgData name="Marcia Moraes" userId="c9c67e8a-58e2-4733-9a1c-5d44fec4775b" providerId="ADAL" clId="{CF9B6DE9-563F-497F-8B3B-C591D75A312C}" dt="2023-03-01T01:11:10.060" v="12" actId="478"/>
-          <ac:picMkLst>
-            <pc:docMk/>
-            <pc:sldMk cId="2571368551" sldId="267"/>
-            <ac:picMk id="1028" creationId="{DD6C2B73-76AC-4C53-83E9-C483E4FB51D4}"/>
-          </ac:picMkLst>
-        </pc:picChg>
-        <pc:picChg chg="del">
-          <ac:chgData name="Marcia Moraes" userId="c9c67e8a-58e2-4733-9a1c-5d44fec4775b" providerId="ADAL" clId="{CF9B6DE9-563F-497F-8B3B-C591D75A312C}" dt="2023-02-28T23:33:55.938" v="0" actId="478"/>
-          <ac:picMkLst>
-            <pc:docMk/>
-            <pc:sldMk cId="2571368551" sldId="267"/>
-            <ac:picMk id="1030" creationId="{816C7A0A-336A-4062-8EE3-E6B475BB6366}"/>
-          </ac:picMkLst>
-        </pc:picChg>
-        <pc:picChg chg="add mod">
-          <ac:chgData name="Marcia Moraes" userId="c9c67e8a-58e2-4733-9a1c-5d44fec4775b" providerId="ADAL" clId="{CF9B6DE9-563F-497F-8B3B-C591D75A312C}" dt="2023-03-01T01:14:13.036" v="19" actId="1076"/>
-          <ac:picMkLst>
-            <pc:docMk/>
-            <pc:sldMk cId="2571368551" sldId="267"/>
-            <ac:picMk id="1032" creationId="{CD0FB3D2-8CE8-47AE-9F67-FDC2C997430F}"/>
-          </ac:picMkLst>
-        </pc:picChg>
-      </pc:sldChg>
-      <pc:sldChg chg="addSp delSp modSp add modAnim">
-        <pc:chgData name="Marcia Moraes" userId="c9c67e8a-58e2-4733-9a1c-5d44fec4775b" providerId="ADAL" clId="{CF9B6DE9-563F-497F-8B3B-C591D75A312C}" dt="2023-03-01T01:37:57.948" v="408"/>
-        <pc:sldMkLst>
-          <pc:docMk/>
-          <pc:sldMk cId="319313488" sldId="268"/>
-        </pc:sldMkLst>
-        <pc:spChg chg="mod">
-          <ac:chgData name="Marcia Moraes" userId="c9c67e8a-58e2-4733-9a1c-5d44fec4775b" providerId="ADAL" clId="{CF9B6DE9-563F-497F-8B3B-C591D75A312C}" dt="2023-03-01T01:32:46.564" v="352" actId="20577"/>
-          <ac:spMkLst>
-            <pc:docMk/>
-            <pc:sldMk cId="319313488" sldId="268"/>
-            <ac:spMk id="2" creationId="{F5DEDEA2-FF16-41B8-8A2C-54DEFEF20F37}"/>
-          </ac:spMkLst>
-        </pc:spChg>
-        <pc:spChg chg="del">
-          <ac:chgData name="Marcia Moraes" userId="c9c67e8a-58e2-4733-9a1c-5d44fec4775b" providerId="ADAL" clId="{CF9B6DE9-563F-497F-8B3B-C591D75A312C}" dt="2023-03-01T01:32:56.999" v="353" actId="478"/>
-          <ac:spMkLst>
-            <pc:docMk/>
-            <pc:sldMk cId="319313488" sldId="268"/>
-            <ac:spMk id="3" creationId="{82101ABA-1E23-4EAE-AA15-C594624F7D5C}"/>
-          </ac:spMkLst>
-        </pc:spChg>
-        <pc:spChg chg="add mod">
-          <ac:chgData name="Marcia Moraes" userId="c9c67e8a-58e2-4733-9a1c-5d44fec4775b" providerId="ADAL" clId="{CF9B6DE9-563F-497F-8B3B-C591D75A312C}" dt="2023-03-01T01:33:42.888" v="368" actId="1076"/>
-          <ac:spMkLst>
-            <pc:docMk/>
-            <pc:sldMk cId="319313488" sldId="268"/>
-            <ac:spMk id="4" creationId="{1D32BB5C-717C-4052-A3AD-37E8F2FA3916}"/>
-          </ac:spMkLst>
-        </pc:spChg>
-        <pc:spChg chg="add mod">
-          <ac:chgData name="Marcia Moraes" userId="c9c67e8a-58e2-4733-9a1c-5d44fec4775b" providerId="ADAL" clId="{CF9B6DE9-563F-497F-8B3B-C591D75A312C}" dt="2023-03-01T01:33:40.916" v="367" actId="1076"/>
-          <ac:spMkLst>
-            <pc:docMk/>
-            <pc:sldMk cId="319313488" sldId="268"/>
-            <ac:spMk id="5" creationId="{B9BA1369-61A1-4E02-8D8B-E926572E74C9}"/>
-          </ac:spMkLst>
-        </pc:spChg>
-        <pc:spChg chg="add mod">
-          <ac:chgData name="Marcia Moraes" userId="c9c67e8a-58e2-4733-9a1c-5d44fec4775b" providerId="ADAL" clId="{CF9B6DE9-563F-497F-8B3B-C591D75A312C}" dt="2023-03-01T01:33:55.884" v="370" actId="1076"/>
-          <ac:spMkLst>
-            <pc:docMk/>
-            <pc:sldMk cId="319313488" sldId="268"/>
-            <ac:spMk id="6" creationId="{676BFE6B-EAEB-48C6-96D8-CF6A7E85D1B4}"/>
-          </ac:spMkLst>
-        </pc:spChg>
-        <pc:spChg chg="add mod">
-          <ac:chgData name="Marcia Moraes" userId="c9c67e8a-58e2-4733-9a1c-5d44fec4775b" providerId="ADAL" clId="{CF9B6DE9-563F-497F-8B3B-C591D75A312C}" dt="2023-03-01T01:34:01.555" v="371" actId="1076"/>
-          <ac:spMkLst>
-            <pc:docMk/>
-            <pc:sldMk cId="319313488" sldId="268"/>
-            <ac:spMk id="7" creationId="{D2C701B8-EEB8-4BCC-9FBF-C4DFCD654BE1}"/>
-          </ac:spMkLst>
-        </pc:spChg>
-        <pc:spChg chg="add mod">
-          <ac:chgData name="Marcia Moraes" userId="c9c67e8a-58e2-4733-9a1c-5d44fec4775b" providerId="ADAL" clId="{CF9B6DE9-563F-497F-8B3B-C591D75A312C}" dt="2023-03-01T01:37:54.612" v="407" actId="207"/>
-          <ac:spMkLst>
-            <pc:docMk/>
-            <pc:sldMk cId="319313488" sldId="268"/>
-            <ac:spMk id="10" creationId="{6BFFBBC7-077F-42DC-A525-BFA9787C4BB9}"/>
-          </ac:spMkLst>
-        </pc:spChg>
-        <pc:picChg chg="add mod">
-          <ac:chgData name="Marcia Moraes" userId="c9c67e8a-58e2-4733-9a1c-5d44fec4775b" providerId="ADAL" clId="{CF9B6DE9-563F-497F-8B3B-C591D75A312C}" dt="2023-03-01T01:34:31.405" v="375" actId="1076"/>
-          <ac:picMkLst>
-            <pc:docMk/>
-            <pc:sldMk cId="319313488" sldId="268"/>
-            <ac:picMk id="8" creationId="{D0B97523-4846-4B82-A7F0-9366255C7510}"/>
-          </ac:picMkLst>
-        </pc:picChg>
-        <pc:picChg chg="add mod">
-          <ac:chgData name="Marcia Moraes" userId="c9c67e8a-58e2-4733-9a1c-5d44fec4775b" providerId="ADAL" clId="{CF9B6DE9-563F-497F-8B3B-C591D75A312C}" dt="2023-03-01T01:34:53.014" v="379" actId="1076"/>
-          <ac:picMkLst>
-            <pc:docMk/>
-            <pc:sldMk cId="319313488" sldId="268"/>
-            <ac:picMk id="9" creationId="{67313CF2-ED43-408B-ADBE-9A4ACB896A34}"/>
-          </ac:picMkLst>
-        </pc:picChg>
-      </pc:sldChg>
-      <pc:sldChg chg="add del">
-        <pc:chgData name="Marcia Moraes" userId="c9c67e8a-58e2-4733-9a1c-5d44fec4775b" providerId="ADAL" clId="{CF9B6DE9-563F-497F-8B3B-C591D75A312C}" dt="2023-03-01T01:23:06.747" v="261" actId="2696"/>
-        <pc:sldMkLst>
-          <pc:docMk/>
-          <pc:sldMk cId="974323312" sldId="268"/>
-        </pc:sldMkLst>
-      </pc:sldChg>
-      <pc:sldChg chg="modSp add del ord">
-        <pc:chgData name="Marcia Moraes" userId="c9c67e8a-58e2-4733-9a1c-5d44fec4775b" providerId="ADAL" clId="{CF9B6DE9-563F-497F-8B3B-C591D75A312C}" dt="2023-03-01T03:22:01.859" v="894" actId="2696"/>
-        <pc:sldMkLst>
-          <pc:docMk/>
-          <pc:sldMk cId="858509741" sldId="269"/>
-        </pc:sldMkLst>
-        <pc:spChg chg="mod">
-          <ac:chgData name="Marcia Moraes" userId="c9c67e8a-58e2-4733-9a1c-5d44fec4775b" providerId="ADAL" clId="{CF9B6DE9-563F-497F-8B3B-C591D75A312C}" dt="2023-03-01T03:21:12.097" v="893"/>
-          <ac:spMkLst>
-            <pc:docMk/>
-            <pc:sldMk cId="858509741" sldId="269"/>
-            <ac:spMk id="5" creationId="{DADDAA0C-CB62-1049-AF60-5356E6C65DB6}"/>
-          </ac:spMkLst>
-        </pc:spChg>
-      </pc:sldChg>
-      <pc:sldChg chg="addSp delSp modSp add modAnim">
-        <pc:chgData name="Marcia Moraes" userId="c9c67e8a-58e2-4733-9a1c-5d44fec4775b" providerId="ADAL" clId="{CF9B6DE9-563F-497F-8B3B-C591D75A312C}" dt="2023-03-01T02:42:20.420" v="572" actId="20577"/>
-        <pc:sldMkLst>
-          <pc:docMk/>
-          <pc:sldMk cId="1104374829" sldId="270"/>
-        </pc:sldMkLst>
-        <pc:spChg chg="add del mod">
-          <ac:chgData name="Marcia Moraes" userId="c9c67e8a-58e2-4733-9a1c-5d44fec4775b" providerId="ADAL" clId="{CF9B6DE9-563F-497F-8B3B-C591D75A312C}" dt="2023-03-01T02:39:21.691" v="462" actId="478"/>
-          <ac:spMkLst>
-            <pc:docMk/>
-            <pc:sldMk cId="1104374829" sldId="270"/>
-            <ac:spMk id="3" creationId="{743C6267-3982-4A8B-88E8-D09CC614997A}"/>
-          </ac:spMkLst>
-        </pc:spChg>
-        <pc:spChg chg="mod">
-          <ac:chgData name="Marcia Moraes" userId="c9c67e8a-58e2-4733-9a1c-5d44fec4775b" providerId="ADAL" clId="{CF9B6DE9-563F-497F-8B3B-C591D75A312C}" dt="2023-03-01T02:41:06.762" v="536" actId="20577"/>
-          <ac:spMkLst>
-            <pc:docMk/>
-            <pc:sldMk cId="1104374829" sldId="270"/>
-            <ac:spMk id="4" creationId="{FAAE6F2E-172B-F74B-A63E-FBEE9F584404}"/>
-          </ac:spMkLst>
-        </pc:spChg>
-        <pc:spChg chg="del">
-          <ac:chgData name="Marcia Moraes" userId="c9c67e8a-58e2-4733-9a1c-5d44fec4775b" providerId="ADAL" clId="{CF9B6DE9-563F-497F-8B3B-C591D75A312C}" dt="2023-03-01T02:39:19.687" v="461" actId="478"/>
-          <ac:spMkLst>
-            <pc:docMk/>
-            <pc:sldMk cId="1104374829" sldId="270"/>
-            <ac:spMk id="5" creationId="{DADDAA0C-CB62-1049-AF60-5356E6C65DB6}"/>
-          </ac:spMkLst>
-        </pc:spChg>
-        <pc:spChg chg="add mod">
-          <ac:chgData name="Marcia Moraes" userId="c9c67e8a-58e2-4733-9a1c-5d44fec4775b" providerId="ADAL" clId="{CF9B6DE9-563F-497F-8B3B-C591D75A312C}" dt="2023-03-01T02:42:20.420" v="572" actId="20577"/>
-          <ac:spMkLst>
-            <pc:docMk/>
-            <pc:sldMk cId="1104374829" sldId="270"/>
-            <ac:spMk id="6" creationId="{79662E79-4734-4241-B72B-DEAA7C3BAF4B}"/>
-          </ac:spMkLst>
-        </pc:spChg>
-        <pc:spChg chg="add mod">
-          <ac:chgData name="Marcia Moraes" userId="c9c67e8a-58e2-4733-9a1c-5d44fec4775b" providerId="ADAL" clId="{CF9B6DE9-563F-497F-8B3B-C591D75A312C}" dt="2023-03-01T02:40:51.249" v="512" actId="20577"/>
-          <ac:spMkLst>
-            <pc:docMk/>
-            <pc:sldMk cId="1104374829" sldId="270"/>
-            <ac:spMk id="7" creationId="{BFD043CA-0672-4F6B-9D60-EA4486DA341D}"/>
-          </ac:spMkLst>
-        </pc:spChg>
-        <pc:picChg chg="add mod">
-          <ac:chgData name="Marcia Moraes" userId="c9c67e8a-58e2-4733-9a1c-5d44fec4775b" providerId="ADAL" clId="{CF9B6DE9-563F-497F-8B3B-C591D75A312C}" dt="2023-03-01T02:41:36.098" v="539" actId="14100"/>
-          <ac:picMkLst>
-            <pc:docMk/>
-            <pc:sldMk cId="1104374829" sldId="270"/>
-            <ac:picMk id="8" creationId="{260E3E14-24E7-4C66-8B73-BBCEA6CD3824}"/>
-          </ac:picMkLst>
-        </pc:picChg>
-      </pc:sldChg>
-      <pc:sldChg chg="addSp delSp modSp add delAnim">
-        <pc:chgData name="Marcia Moraes" userId="c9c67e8a-58e2-4733-9a1c-5d44fec4775b" providerId="ADAL" clId="{CF9B6DE9-563F-497F-8B3B-C591D75A312C}" dt="2023-03-01T02:44:38.811" v="613" actId="1076"/>
-        <pc:sldMkLst>
-          <pc:docMk/>
-          <pc:sldMk cId="1594609392" sldId="271"/>
-        </pc:sldMkLst>
-        <pc:spChg chg="add mod">
-          <ac:chgData name="Marcia Moraes" userId="c9c67e8a-58e2-4733-9a1c-5d44fec4775b" providerId="ADAL" clId="{CF9B6DE9-563F-497F-8B3B-C591D75A312C}" dt="2023-03-01T02:44:35.850" v="612" actId="255"/>
-          <ac:spMkLst>
-            <pc:docMk/>
-            <pc:sldMk cId="1594609392" sldId="271"/>
-            <ac:spMk id="2" creationId="{639C567B-9335-43AD-9474-544737EFEFF7}"/>
-          </ac:spMkLst>
-        </pc:spChg>
-        <pc:spChg chg="mod">
-          <ac:chgData name="Marcia Moraes" userId="c9c67e8a-58e2-4733-9a1c-5d44fec4775b" providerId="ADAL" clId="{CF9B6DE9-563F-497F-8B3B-C591D75A312C}" dt="2023-03-01T02:43:33.811" v="607" actId="20577"/>
-          <ac:spMkLst>
-            <pc:docMk/>
-            <pc:sldMk cId="1594609392" sldId="271"/>
-            <ac:spMk id="4" creationId="{FAAE6F2E-172B-F74B-A63E-FBEE9F584404}"/>
-          </ac:spMkLst>
-        </pc:spChg>
-        <pc:spChg chg="mod">
-          <ac:chgData name="Marcia Moraes" userId="c9c67e8a-58e2-4733-9a1c-5d44fec4775b" providerId="ADAL" clId="{CF9B6DE9-563F-497F-8B3B-C591D75A312C}" dt="2023-03-01T02:44:38.811" v="613" actId="1076"/>
-          <ac:spMkLst>
-            <pc:docMk/>
-            <pc:sldMk cId="1594609392" sldId="271"/>
-            <ac:spMk id="6" creationId="{79662E79-4734-4241-B72B-DEAA7C3BAF4B}"/>
-          </ac:spMkLst>
-        </pc:spChg>
-        <pc:spChg chg="del">
-          <ac:chgData name="Marcia Moraes" userId="c9c67e8a-58e2-4733-9a1c-5d44fec4775b" providerId="ADAL" clId="{CF9B6DE9-563F-497F-8B3B-C591D75A312C}" dt="2023-03-01T02:43:37.098" v="608" actId="478"/>
-          <ac:spMkLst>
-            <pc:docMk/>
-            <pc:sldMk cId="1594609392" sldId="271"/>
-            <ac:spMk id="7" creationId="{BFD043CA-0672-4F6B-9D60-EA4486DA341D}"/>
-          </ac:spMkLst>
-        </pc:spChg>
-        <pc:picChg chg="del">
-          <ac:chgData name="Marcia Moraes" userId="c9c67e8a-58e2-4733-9a1c-5d44fec4775b" providerId="ADAL" clId="{CF9B6DE9-563F-497F-8B3B-C591D75A312C}" dt="2023-03-01T02:43:28.596" v="597" actId="478"/>
-          <ac:picMkLst>
-            <pc:docMk/>
-            <pc:sldMk cId="1594609392" sldId="271"/>
-            <ac:picMk id="8" creationId="{260E3E14-24E7-4C66-8B73-BBCEA6CD3824}"/>
-          </ac:picMkLst>
-        </pc:picChg>
-      </pc:sldChg>
-      <pc:sldChg chg="addSp delSp modSp add delAnim modAnim">
-        <pc:chgData name="Marcia Moraes" userId="c9c67e8a-58e2-4733-9a1c-5d44fec4775b" providerId="ADAL" clId="{CF9B6DE9-563F-497F-8B3B-C591D75A312C}" dt="2023-03-01T03:13:41.333" v="889"/>
-        <pc:sldMkLst>
-          <pc:docMk/>
-          <pc:sldMk cId="1368082852" sldId="272"/>
-        </pc:sldMkLst>
-        <pc:spChg chg="mod">
-          <ac:chgData name="Marcia Moraes" userId="c9c67e8a-58e2-4733-9a1c-5d44fec4775b" providerId="ADAL" clId="{CF9B6DE9-563F-497F-8B3B-C591D75A312C}" dt="2023-03-01T03:05:47.255" v="810" actId="20577"/>
-          <ac:spMkLst>
-            <pc:docMk/>
-            <pc:sldMk cId="1368082852" sldId="272"/>
-            <ac:spMk id="2" creationId="{539AA6FB-C635-3F4C-A3B8-64514A3441C6}"/>
-          </ac:spMkLst>
-        </pc:spChg>
-        <pc:spChg chg="mod">
-          <ac:chgData name="Marcia Moraes" userId="c9c67e8a-58e2-4733-9a1c-5d44fec4775b" providerId="ADAL" clId="{CF9B6DE9-563F-497F-8B3B-C591D75A312C}" dt="2023-03-01T03:07:58.746" v="857" actId="20577"/>
-          <ac:spMkLst>
-            <pc:docMk/>
-            <pc:sldMk cId="1368082852" sldId="272"/>
-            <ac:spMk id="3" creationId="{9EBD3E95-5EDA-0C42-8688-123BE37EC608}"/>
-          </ac:spMkLst>
-        </pc:spChg>
-        <pc:spChg chg="del">
-          <ac:chgData name="Marcia Moraes" userId="c9c67e8a-58e2-4733-9a1c-5d44fec4775b" providerId="ADAL" clId="{CF9B6DE9-563F-497F-8B3B-C591D75A312C}" dt="2023-03-01T03:07:53.104" v="840" actId="478"/>
-          <ac:spMkLst>
-            <pc:docMk/>
-            <pc:sldMk cId="1368082852" sldId="272"/>
-            <ac:spMk id="4" creationId="{F4C21DEF-FFE6-7846-8B15-F8294C302A46}"/>
-          </ac:spMkLst>
-        </pc:spChg>
-        <pc:spChg chg="del">
-          <ac:chgData name="Marcia Moraes" userId="c9c67e8a-58e2-4733-9a1c-5d44fec4775b" providerId="ADAL" clId="{CF9B6DE9-563F-497F-8B3B-C591D75A312C}" dt="2023-03-01T03:07:53.943" v="841" actId="478"/>
-          <ac:spMkLst>
-            <pc:docMk/>
-            <pc:sldMk cId="1368082852" sldId="272"/>
-            <ac:spMk id="5" creationId="{18A788EF-078B-C547-81F9-CA02C1169A20}"/>
-          </ac:spMkLst>
-        </pc:spChg>
-        <pc:spChg chg="mod">
-          <ac:chgData name="Marcia Moraes" userId="c9c67e8a-58e2-4733-9a1c-5d44fec4775b" providerId="ADAL" clId="{CF9B6DE9-563F-497F-8B3B-C591D75A312C}" dt="2023-03-01T03:08:25.364" v="871" actId="1076"/>
-          <ac:spMkLst>
-            <pc:docMk/>
-            <pc:sldMk cId="1368082852" sldId="272"/>
-            <ac:spMk id="6" creationId="{4F117C7A-5AD9-BB42-AC66-5DEA244CC162}"/>
-          </ac:spMkLst>
-        </pc:spChg>
-        <pc:spChg chg="del">
-          <ac:chgData name="Marcia Moraes" userId="c9c67e8a-58e2-4733-9a1c-5d44fec4775b" providerId="ADAL" clId="{CF9B6DE9-563F-497F-8B3B-C591D75A312C}" dt="2023-03-01T03:07:49.711" v="839" actId="478"/>
-          <ac:spMkLst>
-            <pc:docMk/>
-            <pc:sldMk cId="1368082852" sldId="272"/>
-            <ac:spMk id="7" creationId="{9B78E545-AACE-F448-BFEE-45B3ADEE260E}"/>
-          </ac:spMkLst>
-        </pc:spChg>
-        <pc:spChg chg="add mod">
-          <ac:chgData name="Marcia Moraes" userId="c9c67e8a-58e2-4733-9a1c-5d44fec4775b" providerId="ADAL" clId="{CF9B6DE9-563F-497F-8B3B-C591D75A312C}" dt="2023-03-01T03:12:47.380" v="883" actId="207"/>
-          <ac:spMkLst>
-            <pc:docMk/>
-            <pc:sldMk cId="1368082852" sldId="272"/>
-            <ac:spMk id="9" creationId="{510E9A83-62FB-4AC3-845A-B433DA6F61A8}"/>
-          </ac:spMkLst>
-        </pc:spChg>
-        <pc:spChg chg="add mod">
-          <ac:chgData name="Marcia Moraes" userId="c9c67e8a-58e2-4733-9a1c-5d44fec4775b" providerId="ADAL" clId="{CF9B6DE9-563F-497F-8B3B-C591D75A312C}" dt="2023-03-01T03:13:23.063" v="887" actId="207"/>
-          <ac:spMkLst>
-            <pc:docMk/>
-            <pc:sldMk cId="1368082852" sldId="272"/>
-            <ac:spMk id="10" creationId="{48024ACA-50F6-4292-95A6-208559F9EA0D}"/>
-          </ac:spMkLst>
-        </pc:spChg>
-        <pc:picChg chg="add mod">
-          <ac:chgData name="Marcia Moraes" userId="c9c67e8a-58e2-4733-9a1c-5d44fec4775b" providerId="ADAL" clId="{CF9B6DE9-563F-497F-8B3B-C591D75A312C}" dt="2023-03-01T03:09:09.648" v="875" actId="14100"/>
-          <ac:picMkLst>
-            <pc:docMk/>
-            <pc:sldMk cId="1368082852" sldId="272"/>
-            <ac:picMk id="8" creationId="{C708C236-7C07-4B03-B8B7-B6F5DC946C90}"/>
-          </ac:picMkLst>
-        </pc:picChg>
-      </pc:sldChg>
-      <pc:sldChg chg="modSp add">
-        <pc:chgData name="Marcia Moraes" userId="c9c67e8a-58e2-4733-9a1c-5d44fec4775b" providerId="ADAL" clId="{CF9B6DE9-563F-497F-8B3B-C591D75A312C}" dt="2023-03-01T03:22:46.670" v="1005" actId="20577"/>
-        <pc:sldMkLst>
-          <pc:docMk/>
-          <pc:sldMk cId="1103984508" sldId="273"/>
-        </pc:sldMkLst>
-        <pc:spChg chg="mod">
-          <ac:chgData name="Marcia Moraes" userId="c9c67e8a-58e2-4733-9a1c-5d44fec4775b" providerId="ADAL" clId="{CF9B6DE9-563F-497F-8B3B-C591D75A312C}" dt="2023-03-01T03:22:30.286" v="968" actId="20577"/>
-          <ac:spMkLst>
-            <pc:docMk/>
-            <pc:sldMk cId="1103984508" sldId="273"/>
-            <ac:spMk id="2" creationId="{E7715CE4-F115-4C7A-A283-256ED60A30F2}"/>
-          </ac:spMkLst>
-        </pc:spChg>
-        <pc:spChg chg="mod">
-          <ac:chgData name="Marcia Moraes" userId="c9c67e8a-58e2-4733-9a1c-5d44fec4775b" providerId="ADAL" clId="{CF9B6DE9-563F-497F-8B3B-C591D75A312C}" dt="2023-03-01T03:22:46.670" v="1005" actId="20577"/>
-          <ac:spMkLst>
-            <pc:docMk/>
-            <pc:sldMk cId="1103984508" sldId="273"/>
-            <ac:spMk id="3" creationId="{7E30AE7F-EB5F-40B5-83CB-16B6F86ECE5F}"/>
-          </ac:spMkLst>
-        </pc:spChg>
-      </pc:sldChg>
-      <pc:sldChg chg="addSp delSp modSp add ord">
-        <pc:chgData name="Marcia Moraes" userId="c9c67e8a-58e2-4733-9a1c-5d44fec4775b" providerId="ADAL" clId="{CF9B6DE9-563F-497F-8B3B-C591D75A312C}" dt="2023-03-01T03:49:10.468" v="1161" actId="255"/>
-        <pc:sldMkLst>
-          <pc:docMk/>
-          <pc:sldMk cId="1554639760" sldId="274"/>
-        </pc:sldMkLst>
-        <pc:spChg chg="mod">
-          <ac:chgData name="Marcia Moraes" userId="c9c67e8a-58e2-4733-9a1c-5d44fec4775b" providerId="ADAL" clId="{CF9B6DE9-563F-497F-8B3B-C591D75A312C}" dt="2023-03-01T03:49:00.977" v="1160" actId="20577"/>
-          <ac:spMkLst>
-            <pc:docMk/>
-            <pc:sldMk cId="1554639760" sldId="274"/>
-            <ac:spMk id="2" creationId="{86C59E2E-1F56-2646-998C-4D9302402C1C}"/>
-          </ac:spMkLst>
-        </pc:spChg>
-        <pc:spChg chg="del">
-          <ac:chgData name="Marcia Moraes" userId="c9c67e8a-58e2-4733-9a1c-5d44fec4775b" providerId="ADAL" clId="{CF9B6DE9-563F-497F-8B3B-C591D75A312C}" dt="2023-03-01T03:45:04.361" v="1071" actId="478"/>
-          <ac:spMkLst>
-            <pc:docMk/>
-            <pc:sldMk cId="1554639760" sldId="274"/>
-            <ac:spMk id="3" creationId="{4041A6DE-C0FC-A04D-9E80-9EDD35A1AB19}"/>
-          </ac:spMkLst>
-        </pc:spChg>
-        <pc:spChg chg="del">
-          <ac:chgData name="Marcia Moraes" userId="c9c67e8a-58e2-4733-9a1c-5d44fec4775b" providerId="ADAL" clId="{CF9B6DE9-563F-497F-8B3B-C591D75A312C}" dt="2023-03-01T03:45:08.599" v="1072" actId="478"/>
-          <ac:spMkLst>
-            <pc:docMk/>
-            <pc:sldMk cId="1554639760" sldId="274"/>
-            <ac:spMk id="4" creationId="{A80C1401-75D6-8A4C-8530-C4DA01241CE0}"/>
-          </ac:spMkLst>
-        </pc:spChg>
-        <pc:spChg chg="add del mod">
-          <ac:chgData name="Marcia Moraes" userId="c9c67e8a-58e2-4733-9a1c-5d44fec4775b" providerId="ADAL" clId="{CF9B6DE9-563F-497F-8B3B-C591D75A312C}" dt="2023-03-01T03:45:08.599" v="1072" actId="478"/>
-          <ac:spMkLst>
-            <pc:docMk/>
-            <pc:sldMk cId="1554639760" sldId="274"/>
-            <ac:spMk id="6" creationId="{BDF8D3AA-24D9-442A-86AB-046C09888A4F}"/>
-          </ac:spMkLst>
-        </pc:spChg>
-        <pc:spChg chg="add mod">
-          <ac:chgData name="Marcia Moraes" userId="c9c67e8a-58e2-4733-9a1c-5d44fec4775b" providerId="ADAL" clId="{CF9B6DE9-563F-497F-8B3B-C591D75A312C}" dt="2023-03-01T03:49:10.468" v="1161" actId="255"/>
-          <ac:spMkLst>
-            <pc:docMk/>
-            <pc:sldMk cId="1554639760" sldId="274"/>
-            <ac:spMk id="8" creationId="{3C74BD49-54F8-49B9-AB1A-0A302F297CF7}"/>
-          </ac:spMkLst>
-        </pc:spChg>
-        <pc:spChg chg="del">
-          <ac:chgData name="Marcia Moraes" userId="c9c67e8a-58e2-4733-9a1c-5d44fec4775b" providerId="ADAL" clId="{CF9B6DE9-563F-497F-8B3B-C591D75A312C}" dt="2023-03-01T03:45:08.599" v="1072" actId="478"/>
-          <ac:spMkLst>
-            <pc:docMk/>
-            <pc:sldMk cId="1554639760" sldId="274"/>
-            <ac:spMk id="14" creationId="{918196E8-1AF5-4AB5-9743-A345032F6079}"/>
-          </ac:spMkLst>
-        </pc:spChg>
-        <pc:spChg chg="del">
-          <ac:chgData name="Marcia Moraes" userId="c9c67e8a-58e2-4733-9a1c-5d44fec4775b" providerId="ADAL" clId="{CF9B6DE9-563F-497F-8B3B-C591D75A312C}" dt="2023-03-01T03:45:10.163" v="1073" actId="478"/>
-          <ac:spMkLst>
-            <pc:docMk/>
-            <pc:sldMk cId="1554639760" sldId="274"/>
-            <ac:spMk id="33" creationId="{0ACB912E-C6E9-4F28-B832-96F0DB71FA38}"/>
-          </ac:spMkLst>
-        </pc:spChg>
-        <pc:spChg chg="del">
-          <ac:chgData name="Marcia Moraes" userId="c9c67e8a-58e2-4733-9a1c-5d44fec4775b" providerId="ADAL" clId="{CF9B6DE9-563F-497F-8B3B-C591D75A312C}" dt="2023-03-01T03:45:08.599" v="1072" actId="478"/>
-          <ac:spMkLst>
-            <pc:docMk/>
-            <pc:sldMk cId="1554639760" sldId="274"/>
-            <ac:spMk id="34" creationId="{148955D7-3B78-4105-A8B7-39B7A5A1EDA0}"/>
-          </ac:spMkLst>
-        </pc:spChg>
-        <pc:spChg chg="del">
-          <ac:chgData name="Marcia Moraes" userId="c9c67e8a-58e2-4733-9a1c-5d44fec4775b" providerId="ADAL" clId="{CF9B6DE9-563F-497F-8B3B-C591D75A312C}" dt="2023-03-01T03:45:08.599" v="1072" actId="478"/>
-          <ac:spMkLst>
-            <pc:docMk/>
-            <pc:sldMk cId="1554639760" sldId="274"/>
-            <ac:spMk id="35" creationId="{B87E00FC-ED47-4EC0-BA5F-6853C74EC649}"/>
-          </ac:spMkLst>
-        </pc:spChg>
-        <pc:spChg chg="del">
-          <ac:chgData name="Marcia Moraes" userId="c9c67e8a-58e2-4733-9a1c-5d44fec4775b" providerId="ADAL" clId="{CF9B6DE9-563F-497F-8B3B-C591D75A312C}" dt="2023-03-01T03:45:08.599" v="1072" actId="478"/>
-          <ac:spMkLst>
-            <pc:docMk/>
-            <pc:sldMk cId="1554639760" sldId="274"/>
-            <ac:spMk id="36" creationId="{A5864211-9858-41F3-80EE-76D3E7BE555E}"/>
-          </ac:spMkLst>
-        </pc:spChg>
-        <pc:picChg chg="add mod">
-          <ac:chgData name="Marcia Moraes" userId="c9c67e8a-58e2-4733-9a1c-5d44fec4775b" providerId="ADAL" clId="{CF9B6DE9-563F-497F-8B3B-C591D75A312C}" dt="2023-03-01T03:46:55.524" v="1077" actId="1076"/>
-          <ac:picMkLst>
-            <pc:docMk/>
-            <pc:sldMk cId="1554639760" sldId="274"/>
-            <ac:picMk id="7" creationId="{D6A8B8C1-9AD4-4F8E-A4CC-3A4BAAA92BD2}"/>
-          </ac:picMkLst>
-        </pc:picChg>
-      </pc:sldChg>
-      <pc:sldChg chg="addSp delSp modSp add">
-        <pc:chgData name="Marcia Moraes" userId="c9c67e8a-58e2-4733-9a1c-5d44fec4775b" providerId="ADAL" clId="{CF9B6DE9-563F-497F-8B3B-C591D75A312C}" dt="2023-03-01T03:56:48.121" v="1225" actId="6549"/>
-        <pc:sldMkLst>
-          <pc:docMk/>
-          <pc:sldMk cId="1258921908" sldId="275"/>
-        </pc:sldMkLst>
-        <pc:spChg chg="mod">
-          <ac:chgData name="Marcia Moraes" userId="c9c67e8a-58e2-4733-9a1c-5d44fec4775b" providerId="ADAL" clId="{CF9B6DE9-563F-497F-8B3B-C591D75A312C}" dt="2023-03-01T03:55:43.282" v="1218" actId="20577"/>
-          <ac:spMkLst>
-            <pc:docMk/>
-            <pc:sldMk cId="1258921908" sldId="275"/>
-            <ac:spMk id="2" creationId="{86C59E2E-1F56-2646-998C-4D9302402C1C}"/>
-          </ac:spMkLst>
-        </pc:spChg>
-        <pc:spChg chg="add mod">
-          <ac:chgData name="Marcia Moraes" userId="c9c67e8a-58e2-4733-9a1c-5d44fec4775b" providerId="ADAL" clId="{CF9B6DE9-563F-497F-8B3B-C591D75A312C}" dt="2023-03-01T03:56:48.121" v="1225" actId="6549"/>
-          <ac:spMkLst>
-            <pc:docMk/>
-            <pc:sldMk cId="1258921908" sldId="275"/>
-            <ac:spMk id="3" creationId="{C6AE5D7F-162F-4E41-B322-A343045CCD72}"/>
-          </ac:spMkLst>
-        </pc:spChg>
-        <pc:spChg chg="del">
-          <ac:chgData name="Marcia Moraes" userId="c9c67e8a-58e2-4733-9a1c-5d44fec4775b" providerId="ADAL" clId="{CF9B6DE9-563F-497F-8B3B-C591D75A312C}" dt="2023-03-01T03:56:07.126" v="1219" actId="478"/>
-          <ac:spMkLst>
-            <pc:docMk/>
-            <pc:sldMk cId="1258921908" sldId="275"/>
-            <ac:spMk id="8" creationId="{3C74BD49-54F8-49B9-AB1A-0A302F297CF7}"/>
-          </ac:spMkLst>
-        </pc:spChg>
-      </pc:sldChg>
-      <pc:sldChg chg="addSp delSp modSp add">
-        <pc:chgData name="Marcia Moraes" userId="c9c67e8a-58e2-4733-9a1c-5d44fec4775b" providerId="ADAL" clId="{CF9B6DE9-563F-497F-8B3B-C591D75A312C}" dt="2023-03-01T04:01:33.695" v="1288" actId="1076"/>
-        <pc:sldMkLst>
-          <pc:docMk/>
-          <pc:sldMk cId="2921996574" sldId="276"/>
-        </pc:sldMkLst>
-        <pc:spChg chg="mod">
-          <ac:chgData name="Marcia Moraes" userId="c9c67e8a-58e2-4733-9a1c-5d44fec4775b" providerId="ADAL" clId="{CF9B6DE9-563F-497F-8B3B-C591D75A312C}" dt="2023-03-01T03:57:59.033" v="1268" actId="20577"/>
-          <ac:spMkLst>
-            <pc:docMk/>
-            <pc:sldMk cId="2921996574" sldId="276"/>
-            <ac:spMk id="2" creationId="{86C59E2E-1F56-2646-998C-4D9302402C1C}"/>
-          </ac:spMkLst>
-        </pc:spChg>
-        <pc:spChg chg="del">
-          <ac:chgData name="Marcia Moraes" userId="c9c67e8a-58e2-4733-9a1c-5d44fec4775b" providerId="ADAL" clId="{CF9B6DE9-563F-497F-8B3B-C591D75A312C}" dt="2023-03-01T04:00:45.370" v="1269" actId="478"/>
-          <ac:spMkLst>
-            <pc:docMk/>
-            <pc:sldMk cId="2921996574" sldId="276"/>
-            <ac:spMk id="3" creationId="{C6AE5D7F-162F-4E41-B322-A343045CCD72}"/>
-          </ac:spMkLst>
-        </pc:spChg>
-        <pc:spChg chg="add mod">
-          <ac:chgData name="Marcia Moraes" userId="c9c67e8a-58e2-4733-9a1c-5d44fec4775b" providerId="ADAL" clId="{CF9B6DE9-563F-497F-8B3B-C591D75A312C}" dt="2023-03-01T04:01:33.695" v="1288" actId="1076"/>
-          <ac:spMkLst>
-            <pc:docMk/>
-            <pc:sldMk cId="2921996574" sldId="276"/>
-            <ac:spMk id="4" creationId="{E626A159-E555-4CD7-AB5B-D8C912AA5052}"/>
-          </ac:spMkLst>
-        </pc:spChg>
-      </pc:sldChg>
-    </pc:docChg>
   </pc:docChgLst>
 </pc:chgInfo>
 </file>
@@ -1317,7 +286,7 @@
           <a:p>
             <a:fld id="{4D7E51A5-B478-1E40-8CBB-0DAA8831E99D}" type="datetimeFigureOut">
               <a:rPr lang="en-US" smtClean="0"/>
-              <a:t>2/28/2023</a:t>
+              <a:t>9/14/2023</a:t>
             </a:fld>
             <a:endParaRPr lang="en-US"/>
           </a:p>
@@ -1482,7 +451,7 @@
           <a:p>
             <a:fld id="{D0ED587F-861E-6740-9643-E3DDAE89B8D6}" type="datetimeFigureOut">
               <a:rPr lang="en-US" smtClean="0"/>
-              <a:t>2/28/2023</a:t>
+              <a:t>9/14/2023</a:t>
             </a:fld>
             <a:endParaRPr lang="en-US"/>
           </a:p>
@@ -11178,7 +10147,7 @@
         <p:spPr>
           <a:xfrm>
             <a:off x="628075" y="1681593"/>
-            <a:ext cx="10518896" cy="4893647"/>
+            <a:ext cx="9634691" cy="5293757"/>
           </a:xfrm>
           <a:prstGeom prst="rect">
             <a:avLst/>
@@ -11466,7 +10435,7 @@
                 <a:cs typeface="Arial"/>
                 <a:sym typeface="Arial"/>
               </a:rPr>
-              <a:t>Lab 09</a:t>
+              <a:t>Lab 09 – go to your lab to have your participation points</a:t>
             </a:r>
           </a:p>
           <a:p>
@@ -11504,20 +10473,10 @@
                 <a:cs typeface="Arial"/>
                 <a:sym typeface="Arial"/>
               </a:rPr>
-              <a:t>) – you should have already </a:t>
-            </a:r>
-            <a:r>
-              <a:rPr lang="en-US" sz="2600" kern="0">
-                <a:solidFill>
-                  <a:srgbClr val="000000"/>
-                </a:solidFill>
-                <a:cs typeface="Arial"/>
-                <a:sym typeface="Arial"/>
-              </a:rPr>
-              <a:t>done that </a:t>
-            </a:r>
-            <a:r>
-              <a:rPr lang="en-US" sz="2600" kern="0">
+              <a:t>) – you should have already done that </a:t>
+            </a:r>
+            <a:r>
+              <a:rPr lang="en-US" sz="2600" kern="0" dirty="0">
                 <a:solidFill>
                   <a:srgbClr val="000000"/>
                 </a:solidFill>
@@ -11589,7 +10548,7 @@
                 <a:cs typeface="Arial"/>
                 <a:sym typeface="Arial"/>
               </a:rPr>
-              <a:t>10</a:t>
+              <a:t>10 – go to your lab to have your participation points</a:t>
             </a:r>
             <a:endParaRPr kumimoji="0" lang="en-US" sz="2600" b="0" i="0" u="none" strike="noStrike" kern="0" cap="none" spc="0" normalizeH="0" baseline="0" noProof="0" dirty="0">
               <a:ln>
@@ -11847,7 +10806,7 @@
         </p:nvSpPr>
         <p:spPr>
           <a:xfrm>
-            <a:off x="11044238" y="3298371"/>
+            <a:off x="6689953" y="254433"/>
             <a:ext cx="2623491" cy="1938992"/>
           </a:xfrm>
           <a:prstGeom prst="rect">
@@ -11975,6 +10934,1033 @@
           </a:extLst>
         </p:spPr>
       </p:pic>
+      <p:graphicFrame>
+        <p:nvGraphicFramePr>
+          <p:cNvPr id="7" name="Table 6">
+            <a:extLst>
+              <a:ext uri="{FF2B5EF4-FFF2-40B4-BE49-F238E27FC236}">
+                <a16:creationId xmlns:a16="http://schemas.microsoft.com/office/drawing/2014/main" id="{DBD9EAF6-034F-4596-8BB2-87D6191C9F87}"/>
+              </a:ext>
+            </a:extLst>
+          </p:cNvPr>
+          <p:cNvGraphicFramePr>
+            <a:graphicFrameLocks noGrp="1"/>
+          </p:cNvGraphicFramePr>
+          <p:nvPr>
+            <p:extLst>
+              <p:ext uri="{D42A27DB-BD31-4B8C-83A1-F6EECF244321}">
+                <p14:modId xmlns:p14="http://schemas.microsoft.com/office/powerpoint/2010/main" val="3432453000"/>
+              </p:ext>
+            </p:extLst>
+          </p:nvPr>
+        </p:nvGraphicFramePr>
+        <p:xfrm>
+          <a:off x="10262766" y="4132565"/>
+          <a:ext cx="3671207" cy="3097098"/>
+        </p:xfrm>
+        <a:graphic>
+          <a:graphicData uri="http://schemas.openxmlformats.org/drawingml/2006/table">
+            <a:tbl>
+              <a:tblPr/>
+              <a:tblGrid>
+                <a:gridCol w="1197995">
+                  <a:extLst>
+                    <a:ext uri="{9D8B030D-6E8A-4147-A177-3AD203B41FA5}">
+                      <a16:colId xmlns:a16="http://schemas.microsoft.com/office/drawing/2014/main" val="3463123554"/>
+                    </a:ext>
+                  </a:extLst>
+                </a:gridCol>
+                <a:gridCol w="2473212">
+                  <a:extLst>
+                    <a:ext uri="{9D8B030D-6E8A-4147-A177-3AD203B41FA5}">
+                      <a16:colId xmlns:a16="http://schemas.microsoft.com/office/drawing/2014/main" val="378576746"/>
+                    </a:ext>
+                  </a:extLst>
+                </a:gridCol>
+              </a:tblGrid>
+              <a:tr h="289830">
+                <a:tc>
+                  <a:txBody>
+                    <a:bodyPr/>
+                    <a:lstStyle/>
+                    <a:p>
+                      <a:pPr algn="l"/>
+                      <a:r>
+                        <a:rPr lang="en-US" sz="1700">
+                          <a:solidFill>
+                            <a:srgbClr val="000000"/>
+                          </a:solidFill>
+                          <a:effectLst/>
+                        </a:rPr>
+                        <a:t>Day</a:t>
+                      </a:r>
+                    </a:p>
+                  </a:txBody>
+                  <a:tcPr marL="15681" marR="15681" marT="15681" marB="15681" anchor="ctr">
+                    <a:lnL w="6350" cap="flat" cmpd="sng" algn="ctr">
+                      <a:solidFill>
+                        <a:srgbClr val="E0E0E0"/>
+                      </a:solidFill>
+                      <a:prstDash val="solid"/>
+                      <a:round/>
+                      <a:headEnd type="none" w="med" len="med"/>
+                      <a:tailEnd type="none" w="med" len="med"/>
+                    </a:lnL>
+                    <a:lnR w="6350" cap="flat" cmpd="sng" algn="ctr">
+                      <a:solidFill>
+                        <a:srgbClr val="E0E0E0"/>
+                      </a:solidFill>
+                      <a:prstDash val="solid"/>
+                      <a:round/>
+                      <a:headEnd type="none" w="med" len="med"/>
+                      <a:tailEnd type="none" w="med" len="med"/>
+                    </a:lnR>
+                    <a:lnT w="6350" cap="flat" cmpd="sng" algn="ctr">
+                      <a:solidFill>
+                        <a:srgbClr val="E0E0E0"/>
+                      </a:solidFill>
+                      <a:prstDash val="solid"/>
+                      <a:round/>
+                      <a:headEnd type="none" w="med" len="med"/>
+                      <a:tailEnd type="none" w="med" len="med"/>
+                    </a:lnT>
+                    <a:lnB w="6350" cap="flat" cmpd="sng" algn="ctr">
+                      <a:solidFill>
+                        <a:srgbClr val="E0E0E0"/>
+                      </a:solidFill>
+                      <a:prstDash val="solid"/>
+                      <a:round/>
+                      <a:headEnd type="none" w="med" len="med"/>
+                      <a:tailEnd type="none" w="med" len="med"/>
+                    </a:lnB>
+                    <a:solidFill>
+                      <a:srgbClr val="F7F7F7"/>
+                    </a:solidFill>
+                  </a:tcPr>
+                </a:tc>
+                <a:tc>
+                  <a:txBody>
+                    <a:bodyPr/>
+                    <a:lstStyle/>
+                    <a:p>
+                      <a:pPr algn="l"/>
+                      <a:r>
+                        <a:rPr lang="en-US" sz="1700" dirty="0">
+                          <a:solidFill>
+                            <a:srgbClr val="000000"/>
+                          </a:solidFill>
+                          <a:effectLst/>
+                        </a:rPr>
+                        <a:t>Time : Room</a:t>
+                      </a:r>
+                    </a:p>
+                  </a:txBody>
+                  <a:tcPr marL="15681" marR="15681" marT="15681" marB="15681" anchor="ctr">
+                    <a:lnL w="6350" cap="flat" cmpd="sng" algn="ctr">
+                      <a:solidFill>
+                        <a:srgbClr val="E0E0E0"/>
+                      </a:solidFill>
+                      <a:prstDash val="solid"/>
+                      <a:round/>
+                      <a:headEnd type="none" w="med" len="med"/>
+                      <a:tailEnd type="none" w="med" len="med"/>
+                    </a:lnL>
+                    <a:lnR w="6350" cap="flat" cmpd="sng" algn="ctr">
+                      <a:solidFill>
+                        <a:srgbClr val="E0E0E0"/>
+                      </a:solidFill>
+                      <a:prstDash val="solid"/>
+                      <a:round/>
+                      <a:headEnd type="none" w="med" len="med"/>
+                      <a:tailEnd type="none" w="med" len="med"/>
+                    </a:lnR>
+                    <a:lnT w="6350" cap="flat" cmpd="sng" algn="ctr">
+                      <a:solidFill>
+                        <a:srgbClr val="E0E0E0"/>
+                      </a:solidFill>
+                      <a:prstDash val="solid"/>
+                      <a:round/>
+                      <a:headEnd type="none" w="med" len="med"/>
+                      <a:tailEnd type="none" w="med" len="med"/>
+                    </a:lnT>
+                    <a:lnB w="6350" cap="flat" cmpd="sng" algn="ctr">
+                      <a:solidFill>
+                        <a:srgbClr val="E0E0E0"/>
+                      </a:solidFill>
+                      <a:prstDash val="solid"/>
+                      <a:round/>
+                      <a:headEnd type="none" w="med" len="med"/>
+                      <a:tailEnd type="none" w="med" len="med"/>
+                    </a:lnB>
+                    <a:solidFill>
+                      <a:srgbClr val="F7F7F7"/>
+                    </a:solidFill>
+                  </a:tcPr>
+                </a:tc>
+                <a:extLst>
+                  <a:ext uri="{0D108BD9-81ED-4DB2-BD59-A6C34878D82A}">
+                    <a16:rowId xmlns:a16="http://schemas.microsoft.com/office/drawing/2014/main" val="3967578678"/>
+                  </a:ext>
+                </a:extLst>
+              </a:tr>
+              <a:tr h="548296">
+                <a:tc>
+                  <a:txBody>
+                    <a:bodyPr/>
+                    <a:lstStyle/>
+                    <a:p>
+                      <a:r>
+                        <a:rPr lang="en-US" sz="1700">
+                          <a:effectLst/>
+                        </a:rPr>
+                        <a:t>Monday</a:t>
+                      </a:r>
+                    </a:p>
+                  </a:txBody>
+                  <a:tcPr marL="15681" marR="15681" marT="15681" marB="15681" anchor="ctr">
+                    <a:lnL w="6350" cap="flat" cmpd="sng" algn="ctr">
+                      <a:solidFill>
+                        <a:srgbClr val="E0E0E0"/>
+                      </a:solidFill>
+                      <a:prstDash val="solid"/>
+                      <a:round/>
+                      <a:headEnd type="none" w="med" len="med"/>
+                      <a:tailEnd type="none" w="med" len="med"/>
+                    </a:lnL>
+                    <a:lnR w="6350" cap="flat" cmpd="sng" algn="ctr">
+                      <a:solidFill>
+                        <a:srgbClr val="E0E0E0"/>
+                      </a:solidFill>
+                      <a:prstDash val="solid"/>
+                      <a:round/>
+                      <a:headEnd type="none" w="med" len="med"/>
+                      <a:tailEnd type="none" w="med" len="med"/>
+                    </a:lnR>
+                    <a:lnT w="6350" cap="flat" cmpd="sng" algn="ctr">
+                      <a:solidFill>
+                        <a:srgbClr val="E0E0E0"/>
+                      </a:solidFill>
+                      <a:prstDash val="solid"/>
+                      <a:round/>
+                      <a:headEnd type="none" w="med" len="med"/>
+                      <a:tailEnd type="none" w="med" len="med"/>
+                    </a:lnT>
+                    <a:lnB w="6350" cap="flat" cmpd="sng" algn="ctr">
+                      <a:solidFill>
+                        <a:srgbClr val="E0E0E0"/>
+                      </a:solidFill>
+                      <a:prstDash val="solid"/>
+                      <a:round/>
+                      <a:headEnd type="none" w="med" len="med"/>
+                      <a:tailEnd type="none" w="med" len="med"/>
+                    </a:lnB>
+                    <a:solidFill>
+                      <a:srgbClr val="FFFFFF"/>
+                    </a:solidFill>
+                  </a:tcPr>
+                </a:tc>
+                <a:tc>
+                  <a:txBody>
+                    <a:bodyPr/>
+                    <a:lstStyle/>
+                    <a:p>
+                      <a:r>
+                        <a:rPr lang="en-US" sz="1700">
+                          <a:effectLst/>
+                        </a:rPr>
+                        <a:t>12 PM - 2 PM : CSB 120</a:t>
+                      </a:r>
+                    </a:p>
+                  </a:txBody>
+                  <a:tcPr marL="15681" marR="15681" marT="15681" marB="15681" anchor="ctr">
+                    <a:lnL w="6350" cap="flat" cmpd="sng" algn="ctr">
+                      <a:solidFill>
+                        <a:srgbClr val="E0E0E0"/>
+                      </a:solidFill>
+                      <a:prstDash val="solid"/>
+                      <a:round/>
+                      <a:headEnd type="none" w="med" len="med"/>
+                      <a:tailEnd type="none" w="med" len="med"/>
+                    </a:lnL>
+                    <a:lnR w="6350" cap="flat" cmpd="sng" algn="ctr">
+                      <a:solidFill>
+                        <a:srgbClr val="E0E0E0"/>
+                      </a:solidFill>
+                      <a:prstDash val="solid"/>
+                      <a:round/>
+                      <a:headEnd type="none" w="med" len="med"/>
+                      <a:tailEnd type="none" w="med" len="med"/>
+                    </a:lnR>
+                    <a:lnT w="6350" cap="flat" cmpd="sng" algn="ctr">
+                      <a:solidFill>
+                        <a:srgbClr val="E0E0E0"/>
+                      </a:solidFill>
+                      <a:prstDash val="solid"/>
+                      <a:round/>
+                      <a:headEnd type="none" w="med" len="med"/>
+                      <a:tailEnd type="none" w="med" len="med"/>
+                    </a:lnT>
+                    <a:lnB w="6350" cap="flat" cmpd="sng" algn="ctr">
+                      <a:solidFill>
+                        <a:srgbClr val="E0E0E0"/>
+                      </a:solidFill>
+                      <a:prstDash val="solid"/>
+                      <a:round/>
+                      <a:headEnd type="none" w="med" len="med"/>
+                      <a:tailEnd type="none" w="med" len="med"/>
+                    </a:lnB>
+                    <a:solidFill>
+                      <a:srgbClr val="FFFFFF"/>
+                    </a:solidFill>
+                  </a:tcPr>
+                </a:tc>
+                <a:extLst>
+                  <a:ext uri="{0D108BD9-81ED-4DB2-BD59-A6C34878D82A}">
+                    <a16:rowId xmlns:a16="http://schemas.microsoft.com/office/drawing/2014/main" val="4272848274"/>
+                  </a:ext>
+                </a:extLst>
+              </a:tr>
+              <a:tr h="289830">
+                <a:tc>
+                  <a:txBody>
+                    <a:bodyPr/>
+                    <a:lstStyle/>
+                    <a:p>
+                      <a:r>
+                        <a:rPr lang="en-US" sz="1700">
+                          <a:effectLst/>
+                        </a:rPr>
+                        <a:t>Tuesday</a:t>
+                      </a:r>
+                    </a:p>
+                  </a:txBody>
+                  <a:tcPr marL="15681" marR="15681" marT="15681" marB="15681" anchor="ctr">
+                    <a:lnL w="6350" cap="flat" cmpd="sng" algn="ctr">
+                      <a:solidFill>
+                        <a:srgbClr val="E0E0E0"/>
+                      </a:solidFill>
+                      <a:prstDash val="solid"/>
+                      <a:round/>
+                      <a:headEnd type="none" w="med" len="med"/>
+                      <a:tailEnd type="none" w="med" len="med"/>
+                    </a:lnL>
+                    <a:lnR w="6350" cap="flat" cmpd="sng" algn="ctr">
+                      <a:solidFill>
+                        <a:srgbClr val="E0E0E0"/>
+                      </a:solidFill>
+                      <a:prstDash val="solid"/>
+                      <a:round/>
+                      <a:headEnd type="none" w="med" len="med"/>
+                      <a:tailEnd type="none" w="med" len="med"/>
+                    </a:lnR>
+                    <a:lnT w="6350" cap="flat" cmpd="sng" algn="ctr">
+                      <a:solidFill>
+                        <a:srgbClr val="E0E0E0"/>
+                      </a:solidFill>
+                      <a:prstDash val="solid"/>
+                      <a:round/>
+                      <a:headEnd type="none" w="med" len="med"/>
+                      <a:tailEnd type="none" w="med" len="med"/>
+                    </a:lnT>
+                    <a:lnB w="6350" cap="flat" cmpd="sng" algn="ctr">
+                      <a:solidFill>
+                        <a:srgbClr val="E0E0E0"/>
+                      </a:solidFill>
+                      <a:prstDash val="solid"/>
+                      <a:round/>
+                      <a:headEnd type="none" w="med" len="med"/>
+                      <a:tailEnd type="none" w="med" len="med"/>
+                    </a:lnB>
+                    <a:solidFill>
+                      <a:srgbClr val="FFFFFF"/>
+                    </a:solidFill>
+                  </a:tcPr>
+                </a:tc>
+                <a:tc>
+                  <a:txBody>
+                    <a:bodyPr/>
+                    <a:lstStyle/>
+                    <a:p>
+                      <a:r>
+                        <a:rPr lang="en-US" sz="1700">
+                          <a:effectLst/>
+                        </a:rPr>
+                        <a:t>6 PM - 8 PM : Teams</a:t>
+                      </a:r>
+                    </a:p>
+                  </a:txBody>
+                  <a:tcPr marL="15681" marR="15681" marT="15681" marB="15681" anchor="ctr">
+                    <a:lnL w="6350" cap="flat" cmpd="sng" algn="ctr">
+                      <a:solidFill>
+                        <a:srgbClr val="E0E0E0"/>
+                      </a:solidFill>
+                      <a:prstDash val="solid"/>
+                      <a:round/>
+                      <a:headEnd type="none" w="med" len="med"/>
+                      <a:tailEnd type="none" w="med" len="med"/>
+                    </a:lnL>
+                    <a:lnR w="6350" cap="flat" cmpd="sng" algn="ctr">
+                      <a:solidFill>
+                        <a:srgbClr val="E0E0E0"/>
+                      </a:solidFill>
+                      <a:prstDash val="solid"/>
+                      <a:round/>
+                      <a:headEnd type="none" w="med" len="med"/>
+                      <a:tailEnd type="none" w="med" len="med"/>
+                    </a:lnR>
+                    <a:lnT w="6350" cap="flat" cmpd="sng" algn="ctr">
+                      <a:solidFill>
+                        <a:srgbClr val="E0E0E0"/>
+                      </a:solidFill>
+                      <a:prstDash val="solid"/>
+                      <a:round/>
+                      <a:headEnd type="none" w="med" len="med"/>
+                      <a:tailEnd type="none" w="med" len="med"/>
+                    </a:lnT>
+                    <a:lnB w="6350" cap="flat" cmpd="sng" algn="ctr">
+                      <a:solidFill>
+                        <a:srgbClr val="E0E0E0"/>
+                      </a:solidFill>
+                      <a:prstDash val="solid"/>
+                      <a:round/>
+                      <a:headEnd type="none" w="med" len="med"/>
+                      <a:tailEnd type="none" w="med" len="med"/>
+                    </a:lnB>
+                    <a:solidFill>
+                      <a:srgbClr val="FFFFFF"/>
+                    </a:solidFill>
+                  </a:tcPr>
+                </a:tc>
+                <a:extLst>
+                  <a:ext uri="{0D108BD9-81ED-4DB2-BD59-A6C34878D82A}">
+                    <a16:rowId xmlns:a16="http://schemas.microsoft.com/office/drawing/2014/main" val="369786881"/>
+                  </a:ext>
+                </a:extLst>
+              </a:tr>
+              <a:tr h="548296">
+                <a:tc>
+                  <a:txBody>
+                    <a:bodyPr/>
+                    <a:lstStyle/>
+                    <a:p>
+                      <a:r>
+                        <a:rPr lang="en-US" sz="1700">
+                          <a:effectLst/>
+                        </a:rPr>
+                        <a:t>Wednesday</a:t>
+                      </a:r>
+                    </a:p>
+                  </a:txBody>
+                  <a:tcPr marL="15681" marR="15681" marT="15681" marB="15681" anchor="ctr">
+                    <a:lnL w="6350" cap="flat" cmpd="sng" algn="ctr">
+                      <a:solidFill>
+                        <a:srgbClr val="E0E0E0"/>
+                      </a:solidFill>
+                      <a:prstDash val="solid"/>
+                      <a:round/>
+                      <a:headEnd type="none" w="med" len="med"/>
+                      <a:tailEnd type="none" w="med" len="med"/>
+                    </a:lnL>
+                    <a:lnR w="6350" cap="flat" cmpd="sng" algn="ctr">
+                      <a:solidFill>
+                        <a:srgbClr val="E0E0E0"/>
+                      </a:solidFill>
+                      <a:prstDash val="solid"/>
+                      <a:round/>
+                      <a:headEnd type="none" w="med" len="med"/>
+                      <a:tailEnd type="none" w="med" len="med"/>
+                    </a:lnR>
+                    <a:lnT w="6350" cap="flat" cmpd="sng" algn="ctr">
+                      <a:solidFill>
+                        <a:srgbClr val="E0E0E0"/>
+                      </a:solidFill>
+                      <a:prstDash val="solid"/>
+                      <a:round/>
+                      <a:headEnd type="none" w="med" len="med"/>
+                      <a:tailEnd type="none" w="med" len="med"/>
+                    </a:lnT>
+                    <a:lnB w="6350" cap="flat" cmpd="sng" algn="ctr">
+                      <a:solidFill>
+                        <a:srgbClr val="E0E0E0"/>
+                      </a:solidFill>
+                      <a:prstDash val="solid"/>
+                      <a:round/>
+                      <a:headEnd type="none" w="med" len="med"/>
+                      <a:tailEnd type="none" w="med" len="med"/>
+                    </a:lnB>
+                    <a:solidFill>
+                      <a:srgbClr val="FFFFFF"/>
+                    </a:solidFill>
+                  </a:tcPr>
+                </a:tc>
+                <a:tc>
+                  <a:txBody>
+                    <a:bodyPr/>
+                    <a:lstStyle/>
+                    <a:p>
+                      <a:r>
+                        <a:rPr lang="en-US" sz="1700">
+                          <a:effectLst/>
+                        </a:rPr>
+                        <a:t>3 PM - 5 PM : CSB 120</a:t>
+                      </a:r>
+                    </a:p>
+                  </a:txBody>
+                  <a:tcPr marL="15681" marR="15681" marT="15681" marB="15681" anchor="ctr">
+                    <a:lnL w="6350" cap="flat" cmpd="sng" algn="ctr">
+                      <a:solidFill>
+                        <a:srgbClr val="E0E0E0"/>
+                      </a:solidFill>
+                      <a:prstDash val="solid"/>
+                      <a:round/>
+                      <a:headEnd type="none" w="med" len="med"/>
+                      <a:tailEnd type="none" w="med" len="med"/>
+                    </a:lnL>
+                    <a:lnR w="6350" cap="flat" cmpd="sng" algn="ctr">
+                      <a:solidFill>
+                        <a:srgbClr val="E0E0E0"/>
+                      </a:solidFill>
+                      <a:prstDash val="solid"/>
+                      <a:round/>
+                      <a:headEnd type="none" w="med" len="med"/>
+                      <a:tailEnd type="none" w="med" len="med"/>
+                    </a:lnR>
+                    <a:lnT w="6350" cap="flat" cmpd="sng" algn="ctr">
+                      <a:solidFill>
+                        <a:srgbClr val="E0E0E0"/>
+                      </a:solidFill>
+                      <a:prstDash val="solid"/>
+                      <a:round/>
+                      <a:headEnd type="none" w="med" len="med"/>
+                      <a:tailEnd type="none" w="med" len="med"/>
+                    </a:lnT>
+                    <a:lnB w="6350" cap="flat" cmpd="sng" algn="ctr">
+                      <a:solidFill>
+                        <a:srgbClr val="E0E0E0"/>
+                      </a:solidFill>
+                      <a:prstDash val="solid"/>
+                      <a:round/>
+                      <a:headEnd type="none" w="med" len="med"/>
+                      <a:tailEnd type="none" w="med" len="med"/>
+                    </a:lnB>
+                    <a:solidFill>
+                      <a:srgbClr val="FFFFFF"/>
+                    </a:solidFill>
+                  </a:tcPr>
+                </a:tc>
+                <a:extLst>
+                  <a:ext uri="{0D108BD9-81ED-4DB2-BD59-A6C34878D82A}">
+                    <a16:rowId xmlns:a16="http://schemas.microsoft.com/office/drawing/2014/main" val="252902362"/>
+                  </a:ext>
+                </a:extLst>
+              </a:tr>
+              <a:tr h="289830">
+                <a:tc>
+                  <a:txBody>
+                    <a:bodyPr/>
+                    <a:lstStyle/>
+                    <a:p>
+                      <a:r>
+                        <a:rPr lang="en-US" sz="1700">
+                          <a:effectLst/>
+                        </a:rPr>
+                        <a:t>Thursday</a:t>
+                      </a:r>
+                    </a:p>
+                  </a:txBody>
+                  <a:tcPr marL="15681" marR="15681" marT="15681" marB="15681" anchor="ctr">
+                    <a:lnL w="6350" cap="flat" cmpd="sng" algn="ctr">
+                      <a:solidFill>
+                        <a:srgbClr val="E0E0E0"/>
+                      </a:solidFill>
+                      <a:prstDash val="solid"/>
+                      <a:round/>
+                      <a:headEnd type="none" w="med" len="med"/>
+                      <a:tailEnd type="none" w="med" len="med"/>
+                    </a:lnL>
+                    <a:lnR w="6350" cap="flat" cmpd="sng" algn="ctr">
+                      <a:solidFill>
+                        <a:srgbClr val="E0E0E0"/>
+                      </a:solidFill>
+                      <a:prstDash val="solid"/>
+                      <a:round/>
+                      <a:headEnd type="none" w="med" len="med"/>
+                      <a:tailEnd type="none" w="med" len="med"/>
+                    </a:lnR>
+                    <a:lnT w="6350" cap="flat" cmpd="sng" algn="ctr">
+                      <a:solidFill>
+                        <a:srgbClr val="E0E0E0"/>
+                      </a:solidFill>
+                      <a:prstDash val="solid"/>
+                      <a:round/>
+                      <a:headEnd type="none" w="med" len="med"/>
+                      <a:tailEnd type="none" w="med" len="med"/>
+                    </a:lnT>
+                    <a:lnB w="6350" cap="flat" cmpd="sng" algn="ctr">
+                      <a:solidFill>
+                        <a:srgbClr val="E0E0E0"/>
+                      </a:solidFill>
+                      <a:prstDash val="solid"/>
+                      <a:round/>
+                      <a:headEnd type="none" w="med" len="med"/>
+                      <a:tailEnd type="none" w="med" len="med"/>
+                    </a:lnB>
+                    <a:solidFill>
+                      <a:srgbClr val="FFFFFF"/>
+                    </a:solidFill>
+                  </a:tcPr>
+                </a:tc>
+                <a:tc>
+                  <a:txBody>
+                    <a:bodyPr/>
+                    <a:lstStyle/>
+                    <a:p>
+                      <a:r>
+                        <a:rPr lang="en-US" sz="1700">
+                          <a:effectLst/>
+                        </a:rPr>
+                        <a:t>6 PM - 8 PM : Teams</a:t>
+                      </a:r>
+                    </a:p>
+                  </a:txBody>
+                  <a:tcPr marL="15681" marR="15681" marT="15681" marB="15681" anchor="ctr">
+                    <a:lnL w="6350" cap="flat" cmpd="sng" algn="ctr">
+                      <a:solidFill>
+                        <a:srgbClr val="E0E0E0"/>
+                      </a:solidFill>
+                      <a:prstDash val="solid"/>
+                      <a:round/>
+                      <a:headEnd type="none" w="med" len="med"/>
+                      <a:tailEnd type="none" w="med" len="med"/>
+                    </a:lnL>
+                    <a:lnR w="6350" cap="flat" cmpd="sng" algn="ctr">
+                      <a:solidFill>
+                        <a:srgbClr val="E0E0E0"/>
+                      </a:solidFill>
+                      <a:prstDash val="solid"/>
+                      <a:round/>
+                      <a:headEnd type="none" w="med" len="med"/>
+                      <a:tailEnd type="none" w="med" len="med"/>
+                    </a:lnR>
+                    <a:lnT w="6350" cap="flat" cmpd="sng" algn="ctr">
+                      <a:solidFill>
+                        <a:srgbClr val="E0E0E0"/>
+                      </a:solidFill>
+                      <a:prstDash val="solid"/>
+                      <a:round/>
+                      <a:headEnd type="none" w="med" len="med"/>
+                      <a:tailEnd type="none" w="med" len="med"/>
+                    </a:lnT>
+                    <a:lnB w="6350" cap="flat" cmpd="sng" algn="ctr">
+                      <a:solidFill>
+                        <a:srgbClr val="E0E0E0"/>
+                      </a:solidFill>
+                      <a:prstDash val="solid"/>
+                      <a:round/>
+                      <a:headEnd type="none" w="med" len="med"/>
+                      <a:tailEnd type="none" w="med" len="med"/>
+                    </a:lnB>
+                    <a:solidFill>
+                      <a:srgbClr val="FFFFFF"/>
+                    </a:solidFill>
+                  </a:tcPr>
+                </a:tc>
+                <a:extLst>
+                  <a:ext uri="{0D108BD9-81ED-4DB2-BD59-A6C34878D82A}">
+                    <a16:rowId xmlns:a16="http://schemas.microsoft.com/office/drawing/2014/main" val="2125508035"/>
+                  </a:ext>
+                </a:extLst>
+              </a:tr>
+              <a:tr h="548296">
+                <a:tc>
+                  <a:txBody>
+                    <a:bodyPr/>
+                    <a:lstStyle/>
+                    <a:p>
+                      <a:r>
+                        <a:rPr lang="en-US" sz="1700">
+                          <a:effectLst/>
+                        </a:rPr>
+                        <a:t>Friday</a:t>
+                      </a:r>
+                    </a:p>
+                  </a:txBody>
+                  <a:tcPr marL="15681" marR="15681" marT="15681" marB="15681" anchor="ctr">
+                    <a:lnL w="6350" cap="flat" cmpd="sng" algn="ctr">
+                      <a:solidFill>
+                        <a:srgbClr val="E0E0E0"/>
+                      </a:solidFill>
+                      <a:prstDash val="solid"/>
+                      <a:round/>
+                      <a:headEnd type="none" w="med" len="med"/>
+                      <a:tailEnd type="none" w="med" len="med"/>
+                    </a:lnL>
+                    <a:lnR w="6350" cap="flat" cmpd="sng" algn="ctr">
+                      <a:solidFill>
+                        <a:srgbClr val="E0E0E0"/>
+                      </a:solidFill>
+                      <a:prstDash val="solid"/>
+                      <a:round/>
+                      <a:headEnd type="none" w="med" len="med"/>
+                      <a:tailEnd type="none" w="med" len="med"/>
+                    </a:lnR>
+                    <a:lnT w="6350" cap="flat" cmpd="sng" algn="ctr">
+                      <a:solidFill>
+                        <a:srgbClr val="E0E0E0"/>
+                      </a:solidFill>
+                      <a:prstDash val="solid"/>
+                      <a:round/>
+                      <a:headEnd type="none" w="med" len="med"/>
+                      <a:tailEnd type="none" w="med" len="med"/>
+                    </a:lnT>
+                    <a:lnB w="6350" cap="flat" cmpd="sng" algn="ctr">
+                      <a:solidFill>
+                        <a:srgbClr val="E0E0E0"/>
+                      </a:solidFill>
+                      <a:prstDash val="solid"/>
+                      <a:round/>
+                      <a:headEnd type="none" w="med" len="med"/>
+                      <a:tailEnd type="none" w="med" len="med"/>
+                    </a:lnB>
+                    <a:solidFill>
+                      <a:srgbClr val="FFFFFF"/>
+                    </a:solidFill>
+                  </a:tcPr>
+                </a:tc>
+                <a:tc>
+                  <a:txBody>
+                    <a:bodyPr/>
+                    <a:lstStyle/>
+                    <a:p>
+                      <a:r>
+                        <a:rPr lang="en-US" sz="1700">
+                          <a:effectLst/>
+                        </a:rPr>
+                        <a:t>3 PM - 5 PM : CSB 120</a:t>
+                      </a:r>
+                    </a:p>
+                  </a:txBody>
+                  <a:tcPr marL="15681" marR="15681" marT="15681" marB="15681" anchor="ctr">
+                    <a:lnL w="6350" cap="flat" cmpd="sng" algn="ctr">
+                      <a:solidFill>
+                        <a:srgbClr val="E0E0E0"/>
+                      </a:solidFill>
+                      <a:prstDash val="solid"/>
+                      <a:round/>
+                      <a:headEnd type="none" w="med" len="med"/>
+                      <a:tailEnd type="none" w="med" len="med"/>
+                    </a:lnL>
+                    <a:lnR w="6350" cap="flat" cmpd="sng" algn="ctr">
+                      <a:solidFill>
+                        <a:srgbClr val="E0E0E0"/>
+                      </a:solidFill>
+                      <a:prstDash val="solid"/>
+                      <a:round/>
+                      <a:headEnd type="none" w="med" len="med"/>
+                      <a:tailEnd type="none" w="med" len="med"/>
+                    </a:lnR>
+                    <a:lnT w="6350" cap="flat" cmpd="sng" algn="ctr">
+                      <a:solidFill>
+                        <a:srgbClr val="E0E0E0"/>
+                      </a:solidFill>
+                      <a:prstDash val="solid"/>
+                      <a:round/>
+                      <a:headEnd type="none" w="med" len="med"/>
+                      <a:tailEnd type="none" w="med" len="med"/>
+                    </a:lnT>
+                    <a:lnB w="6350" cap="flat" cmpd="sng" algn="ctr">
+                      <a:solidFill>
+                        <a:srgbClr val="E0E0E0"/>
+                      </a:solidFill>
+                      <a:prstDash val="solid"/>
+                      <a:round/>
+                      <a:headEnd type="none" w="med" len="med"/>
+                      <a:tailEnd type="none" w="med" len="med"/>
+                    </a:lnB>
+                    <a:solidFill>
+                      <a:srgbClr val="FFFFFF"/>
+                    </a:solidFill>
+                  </a:tcPr>
+                </a:tc>
+                <a:extLst>
+                  <a:ext uri="{0D108BD9-81ED-4DB2-BD59-A6C34878D82A}">
+                    <a16:rowId xmlns:a16="http://schemas.microsoft.com/office/drawing/2014/main" val="772220127"/>
+                  </a:ext>
+                </a:extLst>
+              </a:tr>
+              <a:tr h="289830">
+                <a:tc>
+                  <a:txBody>
+                    <a:bodyPr/>
+                    <a:lstStyle/>
+                    <a:p>
+                      <a:r>
+                        <a:rPr lang="en-US" sz="1700">
+                          <a:effectLst/>
+                        </a:rPr>
+                        <a:t>Saturday</a:t>
+                      </a:r>
+                    </a:p>
+                  </a:txBody>
+                  <a:tcPr marL="15681" marR="15681" marT="15681" marB="15681" anchor="ctr">
+                    <a:lnL w="6350" cap="flat" cmpd="sng" algn="ctr">
+                      <a:solidFill>
+                        <a:srgbClr val="E0E0E0"/>
+                      </a:solidFill>
+                      <a:prstDash val="solid"/>
+                      <a:round/>
+                      <a:headEnd type="none" w="med" len="med"/>
+                      <a:tailEnd type="none" w="med" len="med"/>
+                    </a:lnL>
+                    <a:lnR w="6350" cap="flat" cmpd="sng" algn="ctr">
+                      <a:solidFill>
+                        <a:srgbClr val="E0E0E0"/>
+                      </a:solidFill>
+                      <a:prstDash val="solid"/>
+                      <a:round/>
+                      <a:headEnd type="none" w="med" len="med"/>
+                      <a:tailEnd type="none" w="med" len="med"/>
+                    </a:lnR>
+                    <a:lnT w="6350" cap="flat" cmpd="sng" algn="ctr">
+                      <a:solidFill>
+                        <a:srgbClr val="E0E0E0"/>
+                      </a:solidFill>
+                      <a:prstDash val="solid"/>
+                      <a:round/>
+                      <a:headEnd type="none" w="med" len="med"/>
+                      <a:tailEnd type="none" w="med" len="med"/>
+                    </a:lnT>
+                    <a:lnB w="6350" cap="flat" cmpd="sng" algn="ctr">
+                      <a:solidFill>
+                        <a:srgbClr val="E0E0E0"/>
+                      </a:solidFill>
+                      <a:prstDash val="solid"/>
+                      <a:round/>
+                      <a:headEnd type="none" w="med" len="med"/>
+                      <a:tailEnd type="none" w="med" len="med"/>
+                    </a:lnB>
+                    <a:solidFill>
+                      <a:srgbClr val="FFFFFF"/>
+                    </a:solidFill>
+                  </a:tcPr>
+                </a:tc>
+                <a:tc>
+                  <a:txBody>
+                    <a:bodyPr/>
+                    <a:lstStyle/>
+                    <a:p>
+                      <a:r>
+                        <a:rPr lang="en-US" sz="1700">
+                          <a:effectLst/>
+                        </a:rPr>
+                        <a:t>12 PM - 4 PM : Teams</a:t>
+                      </a:r>
+                    </a:p>
+                  </a:txBody>
+                  <a:tcPr marL="15681" marR="15681" marT="15681" marB="15681" anchor="ctr">
+                    <a:lnL w="6350" cap="flat" cmpd="sng" algn="ctr">
+                      <a:solidFill>
+                        <a:srgbClr val="E0E0E0"/>
+                      </a:solidFill>
+                      <a:prstDash val="solid"/>
+                      <a:round/>
+                      <a:headEnd type="none" w="med" len="med"/>
+                      <a:tailEnd type="none" w="med" len="med"/>
+                    </a:lnL>
+                    <a:lnR w="6350" cap="flat" cmpd="sng" algn="ctr">
+                      <a:solidFill>
+                        <a:srgbClr val="E0E0E0"/>
+                      </a:solidFill>
+                      <a:prstDash val="solid"/>
+                      <a:round/>
+                      <a:headEnd type="none" w="med" len="med"/>
+                      <a:tailEnd type="none" w="med" len="med"/>
+                    </a:lnR>
+                    <a:lnT w="6350" cap="flat" cmpd="sng" algn="ctr">
+                      <a:solidFill>
+                        <a:srgbClr val="E0E0E0"/>
+                      </a:solidFill>
+                      <a:prstDash val="solid"/>
+                      <a:round/>
+                      <a:headEnd type="none" w="med" len="med"/>
+                      <a:tailEnd type="none" w="med" len="med"/>
+                    </a:lnT>
+                    <a:lnB w="6350" cap="flat" cmpd="sng" algn="ctr">
+                      <a:solidFill>
+                        <a:srgbClr val="E0E0E0"/>
+                      </a:solidFill>
+                      <a:prstDash val="solid"/>
+                      <a:round/>
+                      <a:headEnd type="none" w="med" len="med"/>
+                      <a:tailEnd type="none" w="med" len="med"/>
+                    </a:lnB>
+                    <a:solidFill>
+                      <a:srgbClr val="FFFFFF"/>
+                    </a:solidFill>
+                  </a:tcPr>
+                </a:tc>
+                <a:extLst>
+                  <a:ext uri="{0D108BD9-81ED-4DB2-BD59-A6C34878D82A}">
+                    <a16:rowId xmlns:a16="http://schemas.microsoft.com/office/drawing/2014/main" val="3754499503"/>
+                  </a:ext>
+                </a:extLst>
+              </a:tr>
+              <a:tr h="289830">
+                <a:tc>
+                  <a:txBody>
+                    <a:bodyPr/>
+                    <a:lstStyle/>
+                    <a:p>
+                      <a:r>
+                        <a:rPr lang="en-US" sz="1700">
+                          <a:effectLst/>
+                        </a:rPr>
+                        <a:t>Sunday</a:t>
+                      </a:r>
+                    </a:p>
+                  </a:txBody>
+                  <a:tcPr marL="15681" marR="15681" marT="15681" marB="15681" anchor="ctr">
+                    <a:lnL w="6350" cap="flat" cmpd="sng" algn="ctr">
+                      <a:solidFill>
+                        <a:srgbClr val="E0E0E0"/>
+                      </a:solidFill>
+                      <a:prstDash val="solid"/>
+                      <a:round/>
+                      <a:headEnd type="none" w="med" len="med"/>
+                      <a:tailEnd type="none" w="med" len="med"/>
+                    </a:lnL>
+                    <a:lnR w="6350" cap="flat" cmpd="sng" algn="ctr">
+                      <a:solidFill>
+                        <a:srgbClr val="E0E0E0"/>
+                      </a:solidFill>
+                      <a:prstDash val="solid"/>
+                      <a:round/>
+                      <a:headEnd type="none" w="med" len="med"/>
+                      <a:tailEnd type="none" w="med" len="med"/>
+                    </a:lnR>
+                    <a:lnT w="6350" cap="flat" cmpd="sng" algn="ctr">
+                      <a:solidFill>
+                        <a:srgbClr val="E0E0E0"/>
+                      </a:solidFill>
+                      <a:prstDash val="solid"/>
+                      <a:round/>
+                      <a:headEnd type="none" w="med" len="med"/>
+                      <a:tailEnd type="none" w="med" len="med"/>
+                    </a:lnT>
+                    <a:lnB w="6350" cap="flat" cmpd="sng" algn="ctr">
+                      <a:solidFill>
+                        <a:srgbClr val="E0E0E0"/>
+                      </a:solidFill>
+                      <a:prstDash val="solid"/>
+                      <a:round/>
+                      <a:headEnd type="none" w="med" len="med"/>
+                      <a:tailEnd type="none" w="med" len="med"/>
+                    </a:lnB>
+                    <a:solidFill>
+                      <a:srgbClr val="FFFFFF"/>
+                    </a:solidFill>
+                  </a:tcPr>
+                </a:tc>
+                <a:tc>
+                  <a:txBody>
+                    <a:bodyPr/>
+                    <a:lstStyle/>
+                    <a:p>
+                      <a:r>
+                        <a:rPr lang="en-US" sz="1700" dirty="0">
+                          <a:effectLst/>
+                        </a:rPr>
+                        <a:t>12 PM - 4 PM : Teams</a:t>
+                      </a:r>
+                    </a:p>
+                  </a:txBody>
+                  <a:tcPr marL="15681" marR="15681" marT="15681" marB="15681" anchor="ctr">
+                    <a:lnL w="6350" cap="flat" cmpd="sng" algn="ctr">
+                      <a:solidFill>
+                        <a:srgbClr val="E0E0E0"/>
+                      </a:solidFill>
+                      <a:prstDash val="solid"/>
+                      <a:round/>
+                      <a:headEnd type="none" w="med" len="med"/>
+                      <a:tailEnd type="none" w="med" len="med"/>
+                    </a:lnL>
+                    <a:lnR w="6350" cap="flat" cmpd="sng" algn="ctr">
+                      <a:solidFill>
+                        <a:srgbClr val="E0E0E0"/>
+                      </a:solidFill>
+                      <a:prstDash val="solid"/>
+                      <a:round/>
+                      <a:headEnd type="none" w="med" len="med"/>
+                      <a:tailEnd type="none" w="med" len="med"/>
+                    </a:lnR>
+                    <a:lnT w="6350" cap="flat" cmpd="sng" algn="ctr">
+                      <a:solidFill>
+                        <a:srgbClr val="E0E0E0"/>
+                      </a:solidFill>
+                      <a:prstDash val="solid"/>
+                      <a:round/>
+                      <a:headEnd type="none" w="med" len="med"/>
+                      <a:tailEnd type="none" w="med" len="med"/>
+                    </a:lnT>
+                    <a:lnB w="6350" cap="flat" cmpd="sng" algn="ctr">
+                      <a:solidFill>
+                        <a:srgbClr val="E0E0E0"/>
+                      </a:solidFill>
+                      <a:prstDash val="solid"/>
+                      <a:round/>
+                      <a:headEnd type="none" w="med" len="med"/>
+                      <a:tailEnd type="none" w="med" len="med"/>
+                    </a:lnB>
+                    <a:solidFill>
+                      <a:srgbClr val="FFFFFF"/>
+                    </a:solidFill>
+                  </a:tcPr>
+                </a:tc>
+                <a:extLst>
+                  <a:ext uri="{0D108BD9-81ED-4DB2-BD59-A6C34878D82A}">
+                    <a16:rowId xmlns:a16="http://schemas.microsoft.com/office/drawing/2014/main" val="1778919050"/>
+                  </a:ext>
+                </a:extLst>
+              </a:tr>
+            </a:tbl>
+          </a:graphicData>
+        </a:graphic>
+      </p:graphicFrame>
+      <p:sp>
+        <p:nvSpPr>
+          <p:cNvPr id="8" name="TextBox 7">
+            <a:extLst>
+              <a:ext uri="{FF2B5EF4-FFF2-40B4-BE49-F238E27FC236}">
+                <a16:creationId xmlns:a16="http://schemas.microsoft.com/office/drawing/2014/main" id="{419DC34A-9F78-44AD-852D-CFFD0B137F12}"/>
+              </a:ext>
+            </a:extLst>
+          </p:cNvPr>
+          <p:cNvSpPr txBox="1"/>
+          <p:nvPr/>
+        </p:nvSpPr>
+        <p:spPr>
+          <a:xfrm flipH="1">
+            <a:off x="10213788" y="3673256"/>
+            <a:ext cx="2444933" cy="400110"/>
+          </a:xfrm>
+          <a:prstGeom prst="rect">
+            <a:avLst/>
+          </a:prstGeom>
+          <a:noFill/>
+        </p:spPr>
+        <p:txBody>
+          <a:bodyPr wrap="square" rtlCol="0">
+            <a:spAutoFit/>
+          </a:bodyPr>
+          <a:lstStyle/>
+          <a:p>
+            <a:r>
+              <a:rPr lang="en-US" dirty="0"/>
+              <a:t>Help Desk</a:t>
+            </a:r>
+          </a:p>
+        </p:txBody>
+      </p:sp>
     </p:spTree>
     <p:extLst>
       <p:ext uri="{BB962C8B-B14F-4D97-AF65-F5344CB8AC3E}">
@@ -21732,6 +21718,23 @@
 </file>
 
 <file path=customXml/item1.xml><?xml version="1.0" encoding="utf-8"?>
+<?mso-contentType ?>
+<FormTemplates xmlns="http://schemas.microsoft.com/sharepoint/v3/contenttype/forms">
+  <Display>DocumentLibraryForm</Display>
+  <Edit>DocumentLibraryForm</Edit>
+  <New>DocumentLibraryForm</New>
+</FormTemplates>
+</file>
+
+<file path=customXml/item2.xml><?xml version="1.0" encoding="utf-8"?>
+<p:properties xmlns:p="http://schemas.microsoft.com/office/2006/metadata/properties" xmlns:xsi="http://www.w3.org/2001/XMLSchema-instance" xmlns:pc="http://schemas.microsoft.com/office/infopath/2007/PartnerControls">
+  <documentManagement>
+    <_activity xmlns="92c41bee-f0ee-4aa6-9399-a35fbb883510" xsi:nil="true"/>
+  </documentManagement>
+</p:properties>
+</file>
+
+<file path=customXml/item3.xml><?xml version="1.0" encoding="utf-8"?>
 <ct:contentTypeSchema xmlns:ct="http://schemas.microsoft.com/office/2006/metadata/contentType" xmlns:ma="http://schemas.microsoft.com/office/2006/metadata/properties/metaAttributes" ct:_="" ma:_="" ma:contentTypeName="Document" ma:contentTypeID="0x010100074387D78AC76C4289401EF66FB51FCC" ma:contentTypeVersion="15" ma:contentTypeDescription="Create a new document." ma:contentTypeScope="" ma:versionID="d3659bec8b8330148a03d82a9d99f412">
   <xsd:schema xmlns:xsd="http://www.w3.org/2001/XMLSchema" xmlns:xs="http://www.w3.org/2001/XMLSchema" xmlns:p="http://schemas.microsoft.com/office/2006/metadata/properties" xmlns:ns3="92c41bee-f0ee-4aa6-9399-a35fbb883510" xmlns:ns4="e06ed288-fd75-4b50-bbed-f5a5df88c31c" targetNamespace="http://schemas.microsoft.com/office/2006/metadata/properties" ma:root="true" ma:fieldsID="1a21d371127b63848c9a2290f5945250" ns3:_="" ns4:_="">
     <xsd:import namespace="92c41bee-f0ee-4aa6-9399-a35fbb883510"/>
@@ -21966,24 +21969,32 @@
 </ct:contentTypeSchema>
 </file>
 
-<file path=customXml/item2.xml><?xml version="1.0" encoding="utf-8"?>
-<p:properties xmlns:p="http://schemas.microsoft.com/office/2006/metadata/properties" xmlns:xsi="http://www.w3.org/2001/XMLSchema-instance" xmlns:pc="http://schemas.microsoft.com/office/infopath/2007/PartnerControls">
-  <documentManagement>
-    <_activity xmlns="92c41bee-f0ee-4aa6-9399-a35fbb883510" xsi:nil="true"/>
-  </documentManagement>
-</p:properties>
+<file path=customXml/itemProps1.xml><?xml version="1.0" encoding="utf-8"?>
+<ds:datastoreItem xmlns:ds="http://schemas.openxmlformats.org/officeDocument/2006/customXml" ds:itemID="{1D3C8F87-323F-4E6C-A674-DA352D07EB44}">
+  <ds:schemaRefs>
+    <ds:schemaRef ds:uri="http://schemas.microsoft.com/sharepoint/v3/contenttype/forms"/>
+  </ds:schemaRefs>
+</ds:datastoreItem>
 </file>
 
-<file path=customXml/item3.xml><?xml version="1.0" encoding="utf-8"?>
-<?mso-contentType ?>
-<FormTemplates xmlns="http://schemas.microsoft.com/sharepoint/v3/contenttype/forms">
-  <Display>DocumentLibraryForm</Display>
-  <Edit>DocumentLibraryForm</Edit>
-  <New>DocumentLibraryForm</New>
-</FormTemplates>
+<file path=customXml/itemProps2.xml><?xml version="1.0" encoding="utf-8"?>
+<ds:datastoreItem xmlns:ds="http://schemas.openxmlformats.org/officeDocument/2006/customXml" ds:itemID="{7A25486F-3DA2-469D-90C8-7C69A0E82300}">
+  <ds:schemaRefs>
+    <ds:schemaRef ds:uri="http://schemas.openxmlformats.org/package/2006/metadata/core-properties"/>
+    <ds:schemaRef ds:uri="e06ed288-fd75-4b50-bbed-f5a5df88c31c"/>
+    <ds:schemaRef ds:uri="http://schemas.microsoft.com/office/2006/documentManagement/types"/>
+    <ds:schemaRef ds:uri="http://purl.org/dc/elements/1.1/"/>
+    <ds:schemaRef ds:uri="http://schemas.microsoft.com/office/2006/metadata/properties"/>
+    <ds:schemaRef ds:uri="http://purl.org/dc/dcmitype/"/>
+    <ds:schemaRef ds:uri="http://purl.org/dc/terms/"/>
+    <ds:schemaRef ds:uri="http://www.w3.org/XML/1998/namespace"/>
+    <ds:schemaRef ds:uri="92c41bee-f0ee-4aa6-9399-a35fbb883510"/>
+    <ds:schemaRef ds:uri="http://schemas.microsoft.com/office/infopath/2007/PartnerControls"/>
+  </ds:schemaRefs>
+</ds:datastoreItem>
 </file>
 
-<file path=customXml/itemProps1.xml><?xml version="1.0" encoding="utf-8"?>
+<file path=customXml/itemProps3.xml><?xml version="1.0" encoding="utf-8"?>
 <ds:datastoreItem xmlns:ds="http://schemas.openxmlformats.org/officeDocument/2006/customXml" ds:itemID="{82169D2E-3E22-4AB2-AAC3-0C666B91B225}">
   <ds:schemaRefs>
     <ds:schemaRef ds:uri="http://schemas.microsoft.com/office/2006/metadata/contentType"/>
@@ -22000,29 +22011,4 @@
     <ds:schemaRef ds:uri="http://schemas.microsoft.com/internal/obd"/>
   </ds:schemaRefs>
 </ds:datastoreItem>
-</file>
-
-<file path=customXml/itemProps2.xml><?xml version="1.0" encoding="utf-8"?>
-<ds:datastoreItem xmlns:ds="http://schemas.openxmlformats.org/officeDocument/2006/customXml" ds:itemID="{7A25486F-3DA2-469D-90C8-7C69A0E82300}">
-  <ds:schemaRefs>
-    <ds:schemaRef ds:uri="http://purl.org/dc/elements/1.1/"/>
-    <ds:schemaRef ds:uri="92c41bee-f0ee-4aa6-9399-a35fbb883510"/>
-    <ds:schemaRef ds:uri="http://purl.org/dc/dcmitype/"/>
-    <ds:schemaRef ds:uri="http://schemas.microsoft.com/office/2006/metadata/properties"/>
-    <ds:schemaRef ds:uri="http://purl.org/dc/terms/"/>
-    <ds:schemaRef ds:uri="e06ed288-fd75-4b50-bbed-f5a5df88c31c"/>
-    <ds:schemaRef ds:uri="http://schemas.microsoft.com/office/2006/documentManagement/types"/>
-    <ds:schemaRef ds:uri="http://schemas.microsoft.com/office/infopath/2007/PartnerControls"/>
-    <ds:schemaRef ds:uri="http://schemas.openxmlformats.org/package/2006/metadata/core-properties"/>
-    <ds:schemaRef ds:uri="http://www.w3.org/XML/1998/namespace"/>
-  </ds:schemaRefs>
-</ds:datastoreItem>
-</file>
-
-<file path=customXml/itemProps3.xml><?xml version="1.0" encoding="utf-8"?>
-<ds:datastoreItem xmlns:ds="http://schemas.openxmlformats.org/officeDocument/2006/customXml" ds:itemID="{1D3C8F87-323F-4E6C-A674-DA352D07EB44}">
-  <ds:schemaRefs>
-    <ds:schemaRef ds:uri="http://schemas.microsoft.com/sharepoint/v3/contenttype/forms"/>
-  </ds:schemaRefs>
-</ds:datastoreItem>
 </file>
</xml_diff>

<commit_message>
More Loops Lecture updated
</commit_message>
<xml_diff>
--- a/slides/On-Campus/07_02_MoreLoops.pptx
+++ b/slides/On-Campus/07_02_MoreLoops.pptx
@@ -151,44 +151,20 @@
     <pc:chgData name="Marcia Moraes" userId="c9c67e8a-58e2-4733-9a1c-5d44fec4775b" providerId="ADAL" clId="{C1C84319-6A3A-4D52-931F-09658F5FD03D}"/>
   </pc:docChgLst>
   <pc:docChgLst>
-    <pc:chgData name="Marcia Moraes" userId="c9c67e8a-58e2-4733-9a1c-5d44fec4775b" providerId="ADAL" clId="{F56CB85A-9889-4B47-B6A3-D21A0BED632A}"/>
-    <pc:docChg chg="custSel modSld">
-      <pc:chgData name="Marcia Moraes" userId="c9c67e8a-58e2-4733-9a1c-5d44fec4775b" providerId="ADAL" clId="{F56CB85A-9889-4B47-B6A3-D21A0BED632A}" dt="2023-09-14T15:31:33.834" v="173" actId="14100"/>
+    <pc:chgData name="Marcia Moraes" userId="c9c67e8a-58e2-4733-9a1c-5d44fec4775b" providerId="ADAL" clId="{EF24C896-8379-4A74-9C71-FFF6F9036667}"/>
+    <pc:docChg chg="modSld">
+      <pc:chgData name="Marcia Moraes" userId="c9c67e8a-58e2-4733-9a1c-5d44fec4775b" providerId="ADAL" clId="{EF24C896-8379-4A74-9C71-FFF6F9036667}" dt="2024-02-16T17:44:08.731" v="2" actId="20577"/>
       <pc:docMkLst>
         <pc:docMk/>
       </pc:docMkLst>
-      <pc:sldChg chg="addSp modSp">
-        <pc:chgData name="Marcia Moraes" userId="c9c67e8a-58e2-4733-9a1c-5d44fec4775b" providerId="ADAL" clId="{F56CB85A-9889-4B47-B6A3-D21A0BED632A}" dt="2023-09-14T15:31:33.834" v="173" actId="14100"/>
+      <pc:sldChg chg="modSp">
+        <pc:chgData name="Marcia Moraes" userId="c9c67e8a-58e2-4733-9a1c-5d44fec4775b" providerId="ADAL" clId="{EF24C896-8379-4A74-9C71-FFF6F9036667}" dt="2024-02-16T17:44:08.731" v="2" actId="20577"/>
         <pc:sldMkLst>
           <pc:docMk/>
           <pc:sldMk cId="2571368551" sldId="267"/>
         </pc:sldMkLst>
-        <pc:spChg chg="mod">
-          <ac:chgData name="Marcia Moraes" userId="c9c67e8a-58e2-4733-9a1c-5d44fec4775b" providerId="ADAL" clId="{F56CB85A-9889-4B47-B6A3-D21A0BED632A}" dt="2023-09-14T15:30:07.435" v="0" actId="1076"/>
-          <ac:spMkLst>
-            <pc:docMk/>
-            <pc:sldMk cId="2571368551" sldId="267"/>
-            <ac:spMk id="6" creationId="{A2494937-C0C7-4ABC-A6FF-48F67C26DCCE}"/>
-          </ac:spMkLst>
-        </pc:spChg>
-        <pc:spChg chg="add mod">
-          <ac:chgData name="Marcia Moraes" userId="c9c67e8a-58e2-4733-9a1c-5d44fec4775b" providerId="ADAL" clId="{F56CB85A-9889-4B47-B6A3-D21A0BED632A}" dt="2023-09-14T15:31:28.185" v="172" actId="1076"/>
-          <ac:spMkLst>
-            <pc:docMk/>
-            <pc:sldMk cId="2571368551" sldId="267"/>
-            <ac:spMk id="8" creationId="{419DC34A-9F78-44AD-852D-CFFD0B137F12}"/>
-          </ac:spMkLst>
-        </pc:spChg>
-        <pc:spChg chg="mod">
-          <ac:chgData name="Marcia Moraes" userId="c9c67e8a-58e2-4733-9a1c-5d44fec4775b" providerId="ADAL" clId="{F56CB85A-9889-4B47-B6A3-D21A0BED632A}" dt="2023-09-14T15:31:33.834" v="173" actId="14100"/>
-          <ac:spMkLst>
-            <pc:docMk/>
-            <pc:sldMk cId="2571368551" sldId="267"/>
-            <ac:spMk id="11" creationId="{BDA0DBC1-29A7-4498-B9AA-9B174D0FEC3E}"/>
-          </ac:spMkLst>
-        </pc:spChg>
-        <pc:graphicFrameChg chg="add mod">
-          <ac:chgData name="Marcia Moraes" userId="c9c67e8a-58e2-4733-9a1c-5d44fec4775b" providerId="ADAL" clId="{F56CB85A-9889-4B47-B6A3-D21A0BED632A}" dt="2023-09-14T15:31:28.185" v="172" actId="1076"/>
+        <pc:graphicFrameChg chg="modGraphic">
+          <ac:chgData name="Marcia Moraes" userId="c9c67e8a-58e2-4733-9a1c-5d44fec4775b" providerId="ADAL" clId="{EF24C896-8379-4A74-9C71-FFF6F9036667}" dt="2024-02-16T17:44:08.731" v="2" actId="20577"/>
           <ac:graphicFrameMkLst>
             <pc:docMk/>
             <pc:sldMk cId="2571368551" sldId="267"/>
@@ -197,6 +173,9 @@
         </pc:graphicFrameChg>
       </pc:sldChg>
     </pc:docChg>
+  </pc:docChgLst>
+  <pc:docChgLst>
+    <pc:chgData name="Marcia Moraes" userId="c9c67e8a-58e2-4733-9a1c-5d44fec4775b" providerId="ADAL" clId="{F56CB85A-9889-4B47-B6A3-D21A0BED632A}"/>
   </pc:docChgLst>
   <pc:docChgLst>
     <pc:chgData name="Marcia Moraes" userId="c9c67e8a-58e2-4733-9a1c-5d44fec4775b" providerId="ADAL" clId="{CF9B6DE9-563F-497F-8B3B-C591D75A312C}"/>
@@ -286,7 +265,7 @@
           <a:p>
             <a:fld id="{4D7E51A5-B478-1E40-8CBB-0DAA8831E99D}" type="datetimeFigureOut">
               <a:rPr lang="en-US" smtClean="0"/>
-              <a:t>9/14/2023</a:t>
+              <a:t>2/16/2024</a:t>
             </a:fld>
             <a:endParaRPr lang="en-US"/>
           </a:p>
@@ -451,7 +430,7 @@
           <a:p>
             <a:fld id="{D0ED587F-861E-6740-9643-E3DDAE89B8D6}" type="datetimeFigureOut">
               <a:rPr lang="en-US" smtClean="0"/>
-              <a:t>9/14/2023</a:t>
+              <a:t>2/16/2024</a:t>
             </a:fld>
             <a:endParaRPr lang="en-US"/>
           </a:p>
@@ -10949,7 +10928,7 @@
           <p:nvPr>
             <p:extLst>
               <p:ext uri="{D42A27DB-BD31-4B8C-83A1-F6EECF244321}">
-                <p14:modId xmlns:p14="http://schemas.microsoft.com/office/powerpoint/2010/main" val="3432453000"/>
+                <p14:modId xmlns:p14="http://schemas.microsoft.com/office/powerpoint/2010/main" val="1708816980"/>
               </p:ext>
             </p:extLst>
           </p:nvPr>
@@ -11168,7 +11147,7 @@
                         <a:rPr lang="en-US" sz="1700">
                           <a:effectLst/>
                         </a:rPr>
-                        <a:t>12 PM - 2 PM : CSB 120</a:t>
+                        <a:t>2 PM - 5 PM : CSB 120</a:t>
                       </a:r>
                     </a:p>
                   </a:txBody>
@@ -21727,14 +21706,6 @@
 </file>
 
 <file path=customXml/item2.xml><?xml version="1.0" encoding="utf-8"?>
-<p:properties xmlns:p="http://schemas.microsoft.com/office/2006/metadata/properties" xmlns:xsi="http://www.w3.org/2001/XMLSchema-instance" xmlns:pc="http://schemas.microsoft.com/office/infopath/2007/PartnerControls">
-  <documentManagement>
-    <_activity xmlns="92c41bee-f0ee-4aa6-9399-a35fbb883510" xsi:nil="true"/>
-  </documentManagement>
-</p:properties>
-</file>
-
-<file path=customXml/item3.xml><?xml version="1.0" encoding="utf-8"?>
 <ct:contentTypeSchema xmlns:ct="http://schemas.microsoft.com/office/2006/metadata/contentType" xmlns:ma="http://schemas.microsoft.com/office/2006/metadata/properties/metaAttributes" ct:_="" ma:_="" ma:contentTypeName="Document" ma:contentTypeID="0x010100074387D78AC76C4289401EF66FB51FCC" ma:contentTypeVersion="15" ma:contentTypeDescription="Create a new document." ma:contentTypeScope="" ma:versionID="d3659bec8b8330148a03d82a9d99f412">
   <xsd:schema xmlns:xsd="http://www.w3.org/2001/XMLSchema" xmlns:xs="http://www.w3.org/2001/XMLSchema" xmlns:p="http://schemas.microsoft.com/office/2006/metadata/properties" xmlns:ns3="92c41bee-f0ee-4aa6-9399-a35fbb883510" xmlns:ns4="e06ed288-fd75-4b50-bbed-f5a5df88c31c" targetNamespace="http://schemas.microsoft.com/office/2006/metadata/properties" ma:root="true" ma:fieldsID="1a21d371127b63848c9a2290f5945250" ns3:_="" ns4:_="">
     <xsd:import namespace="92c41bee-f0ee-4aa6-9399-a35fbb883510"/>
@@ -21969,6 +21940,14 @@
 </ct:contentTypeSchema>
 </file>
 
+<file path=customXml/item3.xml><?xml version="1.0" encoding="utf-8"?>
+<p:properties xmlns:p="http://schemas.microsoft.com/office/2006/metadata/properties" xmlns:xsi="http://www.w3.org/2001/XMLSchema-instance" xmlns:pc="http://schemas.microsoft.com/office/infopath/2007/PartnerControls">
+  <documentManagement>
+    <_activity xmlns="92c41bee-f0ee-4aa6-9399-a35fbb883510" xsi:nil="true"/>
+  </documentManagement>
+</p:properties>
+</file>
+
 <file path=customXml/itemProps1.xml><?xml version="1.0" encoding="utf-8"?>
 <ds:datastoreItem xmlns:ds="http://schemas.openxmlformats.org/officeDocument/2006/customXml" ds:itemID="{1D3C8F87-323F-4E6C-A674-DA352D07EB44}">
   <ds:schemaRefs>
@@ -21978,23 +21957,6 @@
 </file>
 
 <file path=customXml/itemProps2.xml><?xml version="1.0" encoding="utf-8"?>
-<ds:datastoreItem xmlns:ds="http://schemas.openxmlformats.org/officeDocument/2006/customXml" ds:itemID="{7A25486F-3DA2-469D-90C8-7C69A0E82300}">
-  <ds:schemaRefs>
-    <ds:schemaRef ds:uri="http://schemas.openxmlformats.org/package/2006/metadata/core-properties"/>
-    <ds:schemaRef ds:uri="e06ed288-fd75-4b50-bbed-f5a5df88c31c"/>
-    <ds:schemaRef ds:uri="http://schemas.microsoft.com/office/2006/documentManagement/types"/>
-    <ds:schemaRef ds:uri="http://purl.org/dc/elements/1.1/"/>
-    <ds:schemaRef ds:uri="http://schemas.microsoft.com/office/2006/metadata/properties"/>
-    <ds:schemaRef ds:uri="http://purl.org/dc/dcmitype/"/>
-    <ds:schemaRef ds:uri="http://purl.org/dc/terms/"/>
-    <ds:schemaRef ds:uri="http://www.w3.org/XML/1998/namespace"/>
-    <ds:schemaRef ds:uri="92c41bee-f0ee-4aa6-9399-a35fbb883510"/>
-    <ds:schemaRef ds:uri="http://schemas.microsoft.com/office/infopath/2007/PartnerControls"/>
-  </ds:schemaRefs>
-</ds:datastoreItem>
-</file>
-
-<file path=customXml/itemProps3.xml><?xml version="1.0" encoding="utf-8"?>
 <ds:datastoreItem xmlns:ds="http://schemas.openxmlformats.org/officeDocument/2006/customXml" ds:itemID="{82169D2E-3E22-4AB2-AAC3-0C666B91B225}">
   <ds:schemaRefs>
     <ds:schemaRef ds:uri="http://schemas.microsoft.com/office/2006/metadata/contentType"/>
@@ -22011,4 +21973,21 @@
     <ds:schemaRef ds:uri="http://schemas.microsoft.com/internal/obd"/>
   </ds:schemaRefs>
 </ds:datastoreItem>
+</file>
+
+<file path=customXml/itemProps3.xml><?xml version="1.0" encoding="utf-8"?>
+<ds:datastoreItem xmlns:ds="http://schemas.openxmlformats.org/officeDocument/2006/customXml" ds:itemID="{7A25486F-3DA2-469D-90C8-7C69A0E82300}">
+  <ds:schemaRefs>
+    <ds:schemaRef ds:uri="http://schemas.microsoft.com/office/infopath/2007/PartnerControls"/>
+    <ds:schemaRef ds:uri="http://purl.org/dc/terms/"/>
+    <ds:schemaRef ds:uri="http://schemas.microsoft.com/office/2006/documentManagement/types"/>
+    <ds:schemaRef ds:uri="http://purl.org/dc/elements/1.1/"/>
+    <ds:schemaRef ds:uri="http://schemas.openxmlformats.org/package/2006/metadata/core-properties"/>
+    <ds:schemaRef ds:uri="e06ed288-fd75-4b50-bbed-f5a5df88c31c"/>
+    <ds:schemaRef ds:uri="92c41bee-f0ee-4aa6-9399-a35fbb883510"/>
+    <ds:schemaRef ds:uri="http://schemas.microsoft.com/office/2006/metadata/properties"/>
+    <ds:schemaRef ds:uri="http://www.w3.org/XML/1998/namespace"/>
+    <ds:schemaRef ds:uri="http://purl.org/dc/dcmitype/"/>
+  </ds:schemaRefs>
+</ds:datastoreItem>
 </file>
</xml_diff>